<commit_message>
updata link and sulution
</commit_message>
<xml_diff>
--- a/Solution_v2.0.pptx
+++ b/Solution_v2.0.pptx
@@ -203,7 +203,7 @@
           <a:p>
             <a:fld id="{FA44945A-58D9-4E1D-9283-1714117EEBC5}" type="datetimeFigureOut">
               <a:rPr lang="zh-CN" altLang="en-US" smtClean="0"/>
-              <a:t>2019/7/21</a:t>
+              <a:t>2019/7/23</a:t>
             </a:fld>
             <a:endParaRPr lang="zh-CN" altLang="en-US"/>
           </a:p>
@@ -686,7 +686,7 @@
           <a:p>
             <a:fld id="{96F2EE66-317E-4C72-B2DB-1291871AF2EE}" type="datetimeFigureOut">
               <a:rPr lang="zh-CN" altLang="en-US" smtClean="0"/>
-              <a:t>2019/7/21</a:t>
+              <a:t>2019/7/23</a:t>
             </a:fld>
             <a:endParaRPr lang="zh-CN" altLang="en-US"/>
           </a:p>
@@ -856,7 +856,7 @@
           <a:p>
             <a:fld id="{96F2EE66-317E-4C72-B2DB-1291871AF2EE}" type="datetimeFigureOut">
               <a:rPr lang="zh-CN" altLang="en-US" smtClean="0"/>
-              <a:t>2019/7/21</a:t>
+              <a:t>2019/7/23</a:t>
             </a:fld>
             <a:endParaRPr lang="zh-CN" altLang="en-US"/>
           </a:p>
@@ -1036,7 +1036,7 @@
           <a:p>
             <a:fld id="{96F2EE66-317E-4C72-B2DB-1291871AF2EE}" type="datetimeFigureOut">
               <a:rPr lang="zh-CN" altLang="en-US" smtClean="0"/>
-              <a:t>2019/7/21</a:t>
+              <a:t>2019/7/23</a:t>
             </a:fld>
             <a:endParaRPr lang="zh-CN" altLang="en-US"/>
           </a:p>
@@ -1206,7 +1206,7 @@
           <a:p>
             <a:fld id="{96F2EE66-317E-4C72-B2DB-1291871AF2EE}" type="datetimeFigureOut">
               <a:rPr lang="zh-CN" altLang="en-US" smtClean="0"/>
-              <a:t>2019/7/21</a:t>
+              <a:t>2019/7/23</a:t>
             </a:fld>
             <a:endParaRPr lang="zh-CN" altLang="en-US"/>
           </a:p>
@@ -1452,7 +1452,7 @@
           <a:p>
             <a:fld id="{96F2EE66-317E-4C72-B2DB-1291871AF2EE}" type="datetimeFigureOut">
               <a:rPr lang="zh-CN" altLang="en-US" smtClean="0"/>
-              <a:t>2019/7/21</a:t>
+              <a:t>2019/7/23</a:t>
             </a:fld>
             <a:endParaRPr lang="zh-CN" altLang="en-US"/>
           </a:p>
@@ -1684,7 +1684,7 @@
           <a:p>
             <a:fld id="{96F2EE66-317E-4C72-B2DB-1291871AF2EE}" type="datetimeFigureOut">
               <a:rPr lang="zh-CN" altLang="en-US" smtClean="0"/>
-              <a:t>2019/7/21</a:t>
+              <a:t>2019/7/23</a:t>
             </a:fld>
             <a:endParaRPr lang="zh-CN" altLang="en-US"/>
           </a:p>
@@ -2051,7 +2051,7 @@
           <a:p>
             <a:fld id="{96F2EE66-317E-4C72-B2DB-1291871AF2EE}" type="datetimeFigureOut">
               <a:rPr lang="zh-CN" altLang="en-US" smtClean="0"/>
-              <a:t>2019/7/21</a:t>
+              <a:t>2019/7/23</a:t>
             </a:fld>
             <a:endParaRPr lang="zh-CN" altLang="en-US"/>
           </a:p>
@@ -2169,7 +2169,7 @@
           <a:p>
             <a:fld id="{96F2EE66-317E-4C72-B2DB-1291871AF2EE}" type="datetimeFigureOut">
               <a:rPr lang="zh-CN" altLang="en-US" smtClean="0"/>
-              <a:t>2019/7/21</a:t>
+              <a:t>2019/7/23</a:t>
             </a:fld>
             <a:endParaRPr lang="zh-CN" altLang="en-US"/>
           </a:p>
@@ -2264,7 +2264,7 @@
           <a:p>
             <a:fld id="{96F2EE66-317E-4C72-B2DB-1291871AF2EE}" type="datetimeFigureOut">
               <a:rPr lang="zh-CN" altLang="en-US" smtClean="0"/>
-              <a:t>2019/7/21</a:t>
+              <a:t>2019/7/23</a:t>
             </a:fld>
             <a:endParaRPr lang="zh-CN" altLang="en-US"/>
           </a:p>
@@ -2541,7 +2541,7 @@
           <a:p>
             <a:fld id="{96F2EE66-317E-4C72-B2DB-1291871AF2EE}" type="datetimeFigureOut">
               <a:rPr lang="zh-CN" altLang="en-US" smtClean="0"/>
-              <a:t>2019/7/21</a:t>
+              <a:t>2019/7/23</a:t>
             </a:fld>
             <a:endParaRPr lang="zh-CN" altLang="en-US"/>
           </a:p>
@@ -2794,7 +2794,7 @@
           <a:p>
             <a:fld id="{96F2EE66-317E-4C72-B2DB-1291871AF2EE}" type="datetimeFigureOut">
               <a:rPr lang="zh-CN" altLang="en-US" smtClean="0"/>
-              <a:t>2019/7/21</a:t>
+              <a:t>2019/7/23</a:t>
             </a:fld>
             <a:endParaRPr lang="zh-CN" altLang="en-US"/>
           </a:p>
@@ -3007,7 +3007,7 @@
           <a:p>
             <a:fld id="{96F2EE66-317E-4C72-B2DB-1291871AF2EE}" type="datetimeFigureOut">
               <a:rPr lang="zh-CN" altLang="en-US" smtClean="0"/>
-              <a:t>2019/7/21</a:t>
+              <a:t>2019/7/23</a:t>
             </a:fld>
             <a:endParaRPr lang="zh-CN" altLang="en-US"/>
           </a:p>
@@ -3473,11 +3473,7 @@
             </a:r>
             <a:r>
               <a:rPr lang="en-US" altLang="zh-CN" i="1" smtClean="0"/>
-              <a:t>weibo.com</a:t>
-            </a:r>
-            <a:r>
-              <a:rPr lang="en-US" altLang="zh-CN" i="1" smtClean="0"/>
-              <a:t>/@</a:t>
+              <a:t>weibo.com/@</a:t>
             </a:r>
             <a:r>
               <a:rPr lang="zh-CN" altLang="en-US" i="1" smtClean="0"/>
@@ -3499,7 +3495,7 @@
               <a:t>：</a:t>
             </a:r>
             <a:r>
-              <a:rPr lang="en-US" altLang="zh-CN"/>
+              <a:rPr lang="en-US" altLang="zh-CN" smtClean="0"/>
               <a:t>https://m.weibo.cn/profile/6697930990</a:t>
             </a:r>
             <a:endParaRPr lang="zh-CN" altLang="zh-CN"/>
@@ -3518,7 +3514,6 @@
               <a:rPr lang="en-US" altLang="zh-CN"/>
               <a:t>https://passport.weibo.cn/signin/login</a:t>
             </a:r>
-            <a:endParaRPr lang="en-US" altLang="zh-CN"/>
           </a:p>
           <a:p>
             <a:pPr algn="l"/>
@@ -3838,11 +3833,7 @@
             </a:r>
             <a:r>
               <a:rPr lang="zh-CN" altLang="en-US" smtClean="0"/>
-              <a:t>来将自己的登录信息提交到微博</a:t>
-            </a:r>
-            <a:r>
-              <a:rPr lang="zh-CN" altLang="en-US" smtClean="0"/>
-              <a:t>上，获取到自己的</a:t>
+              <a:t>来将自己的登录信息提交到微博上，获取到自己的</a:t>
             </a:r>
             <a:r>
               <a:rPr lang="en-US" altLang="zh-CN" smtClean="0"/>
@@ -3865,11 +3856,7 @@
           <a:p>
             <a:r>
               <a:rPr lang="zh-CN" altLang="en-US" smtClean="0"/>
-              <a:t>可</a:t>
-            </a:r>
-            <a:r>
-              <a:rPr lang="zh-CN" altLang="en-US" smtClean="0"/>
-              <a:t>使用</a:t>
+              <a:t>可使用</a:t>
             </a:r>
             <a:r>
               <a:rPr lang="en-US" altLang="zh-CN" smtClean="0"/>
@@ -3887,11 +3874,7 @@
           <a:p>
             <a:r>
               <a:rPr lang="zh-CN" altLang="en-US" smtClean="0"/>
-              <a:t>一</a:t>
-            </a:r>
-            <a:r>
-              <a:rPr lang="zh-CN" altLang="en-US" smtClean="0"/>
-              <a:t>个</a:t>
+              <a:t>一个</a:t>
             </a:r>
             <a:r>
               <a:rPr lang="en-US" altLang="zh-CN" smtClean="0"/>
@@ -3938,11 +3921,7 @@
             </a:r>
             <a:r>
               <a:rPr lang="en-US" altLang="zh-CN"/>
-              <a:t>Asynchronouse JavaScript </a:t>
-            </a:r>
-            <a:r>
-              <a:rPr lang="en-US" altLang="zh-CN"/>
-              <a:t>And </a:t>
+              <a:t>Asynchronouse JavaScript And </a:t>
             </a:r>
             <a:r>
               <a:rPr lang="en-US" altLang="zh-CN" smtClean="0"/>
@@ -4082,15 +4061,7 @@
             </a:r>
             <a:r>
               <a:rPr lang="zh-CN" altLang="en-US" smtClean="0"/>
-              <a:t>模块时，</a:t>
-            </a:r>
-            <a:r>
-              <a:rPr lang="zh-CN" altLang="en-US" smtClean="0"/>
-              <a:t>可以</a:t>
-            </a:r>
-            <a:r>
-              <a:rPr lang="zh-CN" altLang="en-US" smtClean="0"/>
-              <a:t>使用</a:t>
+              <a:t>模块时，可以使用</a:t>
             </a:r>
             <a:r>
               <a:rPr lang="en-US" altLang="zh-CN" smtClean="0"/>
@@ -4098,11 +4069,7 @@
             </a:r>
             <a:r>
               <a:rPr lang="zh-CN" altLang="en-US" smtClean="0"/>
-              <a:t>来获取</a:t>
-            </a:r>
-            <a:r>
-              <a:rPr lang="zh-CN" altLang="en-US" smtClean="0"/>
-              <a:t>网页源代码</a:t>
+              <a:t>来获取网页源代码</a:t>
             </a:r>
             <a:endParaRPr lang="en-US" altLang="zh-CN" smtClean="0"/>
           </a:p>
@@ -4121,11 +4088,7 @@
             </a:r>
             <a:r>
               <a:rPr lang="en-US" altLang="zh-CN" smtClean="0"/>
-              <a:t>requests.post</a:t>
-            </a:r>
-            <a:r>
-              <a:rPr lang="en-US" altLang="zh-CN" smtClean="0"/>
-              <a:t>()</a:t>
+              <a:t>requests.post()</a:t>
             </a:r>
             <a:r>
               <a:rPr lang="zh-CN" altLang="en-US" smtClean="0"/>
@@ -4152,11 +4115,7 @@
             </a:r>
             <a:r>
               <a:rPr lang="zh-CN" altLang="en-US" smtClean="0"/>
-              <a:t>模块来分割字符串，获取</a:t>
-            </a:r>
-            <a:r>
-              <a:rPr lang="zh-CN" altLang="en-US" smtClean="0"/>
-              <a:t>信息</a:t>
+              <a:t>模块来分割字符串，获取信息</a:t>
             </a:r>
             <a:endParaRPr lang="en-US" altLang="zh-CN" smtClean="0"/>
           </a:p>
@@ -4179,11 +4138,7 @@
             </a:r>
             <a:r>
               <a:rPr lang="zh-CN" altLang="en-US"/>
-              <a:t>模块</a:t>
-            </a:r>
-            <a:r>
-              <a:rPr lang="zh-CN" altLang="en-US"/>
-              <a:t>来</a:t>
+              <a:t>模块来</a:t>
             </a:r>
             <a:r>
               <a:rPr lang="zh-CN" altLang="en-US" smtClean="0"/>
@@ -4217,11 +4172,7 @@
             </a:r>
             <a:r>
               <a:rPr lang="zh-CN" altLang="en-US" smtClean="0"/>
-              <a:t>模块，但是他的网页获取函数和上传函数全部都会</a:t>
-            </a:r>
-            <a:r>
-              <a:rPr lang="zh-CN" altLang="en-US" smtClean="0"/>
-              <a:t>改变</a:t>
+              <a:t>模块，但是他的网页获取函数和上传函数全部都会改变</a:t>
             </a:r>
             <a:endParaRPr lang="en-US" altLang="zh-CN" smtClean="0"/>
           </a:p>
@@ -5280,15 +5231,7 @@
                   <a:schemeClr val="tx1"/>
                 </a:solidFill>
               </a:rPr>
-              <a:t>输入密码等待登录成功</a:t>
-            </a:r>
-            <a:r>
-              <a:rPr lang="zh-CN" altLang="en-US" smtClean="0">
-                <a:solidFill>
-                  <a:schemeClr val="tx1"/>
-                </a:solidFill>
-              </a:rPr>
-              <a:t>后</a:t>
+              <a:t>输入密码等待登录成功后</a:t>
             </a:r>
             <a:r>
               <a:rPr lang="en-US" altLang="zh-CN" smtClean="0">
@@ -5350,37 +5293,8 @@
                   <a:schemeClr val="tx1"/>
                 </a:solidFill>
               </a:rPr>
-              <a:t>html = </a:t>
-            </a:r>
-            <a:r>
-              <a:rPr lang="en-US" altLang="zh-CN" smtClean="0">
-                <a:solidFill>
-                  <a:schemeClr val="tx1"/>
-                </a:solidFill>
-              </a:rPr>
-              <a:t>requests.post(url,</a:t>
-            </a:r>
-            <a:r>
-              <a:rPr lang="en-US" altLang="zh-CN" smtClean="0">
-                <a:solidFill>
-                  <a:schemeClr val="tx1"/>
-                </a:solidFill>
-              </a:rPr>
-              <a:t>headers,data</a:t>
-            </a:r>
-            <a:r>
-              <a:rPr lang="en-US" altLang="zh-CN" smtClean="0">
-                <a:solidFill>
-                  <a:schemeClr val="tx1"/>
-                </a:solidFill>
-              </a:rPr>
-              <a:t>) </a:t>
-            </a:r>
-            <a:endParaRPr lang="en-US" altLang="zh-CN" smtClean="0">
-              <a:solidFill>
-                <a:schemeClr val="tx1"/>
-              </a:solidFill>
-            </a:endParaRPr>
+              <a:t>html = requests.post(url,headers,data) </a:t>
+            </a:r>
           </a:p>
           <a:p>
             <a:pPr marL="342900" indent="-342900">
@@ -5701,15 +5615,7 @@
                             <a:schemeClr val="tx1"/>
                           </a:solidFill>
                         </a:rPr>
-                        <a:t>    f.write(r.content</a:t>
-                      </a:r>
-                      <a:r>
-                        <a:rPr lang="en-US" altLang="zh-CN" b="0" smtClean="0">
-                          <a:solidFill>
-                            <a:schemeClr val="tx1"/>
-                          </a:solidFill>
-                        </a:rPr>
-                        <a:t>)</a:t>
+                        <a:t>    f.write(r.content)</a:t>
                       </a:r>
                     </a:p>
                     <a:p>
@@ -5982,13 +5888,13 @@
           <p:nvPr>
             <p:extLst>
               <p:ext uri="{D42A27DB-BD31-4B8C-83A1-F6EECF244321}">
-                <p14:modId xmlns:p14="http://schemas.microsoft.com/office/powerpoint/2010/main" val="2328777980"/>
+                <p14:modId xmlns:p14="http://schemas.microsoft.com/office/powerpoint/2010/main" val="3466164703"/>
               </p:ext>
             </p:extLst>
           </p:nvPr>
         </p:nvGraphicFramePr>
         <p:xfrm>
-          <a:off x="5530044" y="1131791"/>
+          <a:off x="5653824" y="2411951"/>
           <a:ext cx="6035183" cy="1463040"/>
         </p:xfrm>
         <a:graphic>
@@ -6130,8 +6036,9 @@
                   </a:txBody>
                   <a:tcPr>
                     <a:solidFill>
-                      <a:schemeClr val="bg1">
-                        <a:lumMod val="65000"/>
+                      <a:schemeClr val="accent2">
+                        <a:lumMod val="40000"/>
+                        <a:lumOff val="60000"/>
                       </a:schemeClr>
                     </a:solidFill>
                   </a:tcPr>
@@ -6266,6 +6173,191 @@
                     <a:solidFill>
                       <a:schemeClr val="bg1">
                         <a:lumMod val="65000"/>
+                      </a:schemeClr>
+                    </a:solidFill>
+                  </a:tcPr>
+                </a:tc>
+                <a:extLst>
+                  <a:ext uri="{0D108BD9-81ED-4DB2-BD59-A6C34878D82A}">
+                    <a16:rowId xmlns:a16="http://schemas.microsoft.com/office/drawing/2014/main" val="1888392844"/>
+                  </a:ext>
+                </a:extLst>
+              </a:tr>
+            </a:tbl>
+          </a:graphicData>
+        </a:graphic>
+      </p:graphicFrame>
+      <p:graphicFrame>
+        <p:nvGraphicFramePr>
+          <p:cNvPr id="8" name="表格 7"/>
+          <p:cNvGraphicFramePr>
+            <a:graphicFrameLocks noGrp="1"/>
+          </p:cNvGraphicFramePr>
+          <p:nvPr>
+            <p:extLst>
+              <p:ext uri="{D42A27DB-BD31-4B8C-83A1-F6EECF244321}">
+                <p14:modId xmlns:p14="http://schemas.microsoft.com/office/powerpoint/2010/main" val="975242708"/>
+              </p:ext>
+            </p:extLst>
+          </p:nvPr>
+        </p:nvGraphicFramePr>
+        <p:xfrm>
+          <a:off x="5530045" y="256863"/>
+          <a:ext cx="6282743" cy="2011680"/>
+        </p:xfrm>
+        <a:graphic>
+          <a:graphicData uri="http://schemas.openxmlformats.org/drawingml/2006/table">
+            <a:tbl>
+              <a:tblPr firstRow="1" bandRow="1">
+                <a:tableStyleId>{5C22544A-7EE6-4342-B048-85BDC9FD1C3A}</a:tableStyleId>
+              </a:tblPr>
+              <a:tblGrid>
+                <a:gridCol w="6282743">
+                  <a:extLst>
+                    <a:ext uri="{9D8B030D-6E8A-4147-A177-3AD203B41FA5}">
+                      <a16:colId xmlns:a16="http://schemas.microsoft.com/office/drawing/2014/main" val="3988467799"/>
+                    </a:ext>
+                  </a:extLst>
+                </a:gridCol>
+              </a:tblGrid>
+              <a:tr h="1057619">
+                <a:tc>
+                  <a:txBody>
+                    <a:bodyPr/>
+                    <a:lstStyle/>
+                    <a:p>
+                      <a:r>
+                        <a:rPr lang="en-US" altLang="zh-CN" b="0" smtClean="0">
+                          <a:solidFill>
+                            <a:schemeClr val="tx1"/>
+                          </a:solidFill>
+                        </a:rPr>
+                        <a:t>from selenium import webdriver</a:t>
+                      </a:r>
+                    </a:p>
+                    <a:p>
+                      <a:r>
+                        <a:rPr lang="en-US" altLang="zh-CN" b="0" smtClean="0">
+                          <a:solidFill>
+                            <a:schemeClr val="tx1"/>
+                          </a:solidFill>
+                        </a:rPr>
+                        <a:t>#Firefox</a:t>
+                      </a:r>
+                      <a:r>
+                        <a:rPr lang="zh-CN" altLang="en-US" b="0" smtClean="0">
+                          <a:solidFill>
+                            <a:schemeClr val="tx1"/>
+                          </a:solidFill>
+                        </a:rPr>
+                        <a:t>的</a:t>
+                      </a:r>
+                      <a:r>
+                        <a:rPr lang="en-US" altLang="zh-CN" b="0" smtClean="0">
+                          <a:solidFill>
+                            <a:schemeClr val="tx1"/>
+                          </a:solidFill>
+                        </a:rPr>
+                        <a:t>drivers</a:t>
+                      </a:r>
+                      <a:r>
+                        <a:rPr lang="zh-CN" altLang="en-US" b="0" smtClean="0">
+                          <a:solidFill>
+                            <a:schemeClr val="tx1"/>
+                          </a:solidFill>
+                        </a:rPr>
+                        <a:t>的纯英文路径</a:t>
+                      </a:r>
+                      <a:endParaRPr lang="en-US" altLang="zh-CN" b="0" smtClean="0">
+                        <a:solidFill>
+                          <a:schemeClr val="tx1"/>
+                        </a:solidFill>
+                      </a:endParaRPr>
+                    </a:p>
+                    <a:p>
+                      <a:r>
+                        <a:rPr lang="en-US" altLang="zh-CN" b="0" smtClean="0">
+                          <a:solidFill>
+                            <a:schemeClr val="tx1"/>
+                          </a:solidFill>
+                        </a:rPr>
+                        <a:t>driver_path = r'D:\ProjectPerson\firefoxdrive\geckodriver.exe'</a:t>
+                      </a:r>
+                    </a:p>
+                    <a:p>
+                      <a:r>
+                        <a:rPr lang="en-US" altLang="zh-CN" b="0" smtClean="0">
+                          <a:solidFill>
+                            <a:schemeClr val="tx1"/>
+                          </a:solidFill>
+                        </a:rPr>
+                        <a:t>#</a:t>
+                      </a:r>
+                      <a:r>
+                        <a:rPr lang="zh-CN" altLang="en-US" b="0" smtClean="0">
+                          <a:solidFill>
+                            <a:schemeClr val="tx1"/>
+                          </a:solidFill>
+                        </a:rPr>
+                        <a:t>注意火狐的</a:t>
+                      </a:r>
+                      <a:r>
+                        <a:rPr lang="en-US" altLang="zh-CN" b="0" smtClean="0">
+                          <a:solidFill>
+                            <a:schemeClr val="tx1"/>
+                          </a:solidFill>
+                        </a:rPr>
+                        <a:t>Firefox</a:t>
+                      </a:r>
+                      <a:r>
+                        <a:rPr lang="zh-CN" altLang="en-US" b="0" smtClean="0">
+                          <a:solidFill>
+                            <a:schemeClr val="tx1"/>
+                          </a:solidFill>
+                        </a:rPr>
+                        <a:t>首字母大写，否则将会报错</a:t>
+                      </a:r>
+                      <a:endParaRPr lang="en-US" altLang="zh-CN" b="0" smtClean="0">
+                        <a:solidFill>
+                          <a:schemeClr val="tx1"/>
+                        </a:solidFill>
+                      </a:endParaRPr>
+                    </a:p>
+                    <a:p>
+                      <a:r>
+                        <a:rPr lang="en-US" altLang="zh-CN" b="0" smtClean="0">
+                          <a:solidFill>
+                            <a:schemeClr val="tx1"/>
+                          </a:solidFill>
+                        </a:rPr>
+                        <a:t>driver = webdriver.Firefox(executable_path = driver_path)</a:t>
+                      </a:r>
+                    </a:p>
+                    <a:p>
+                      <a:r>
+                        <a:rPr lang="en-US" altLang="zh-CN" b="0" smtClean="0">
+                          <a:solidFill>
+                            <a:schemeClr val="tx1"/>
+                          </a:solidFill>
+                        </a:rPr>
+                        <a:t>driver.get("https://www.baidu.com")</a:t>
+                      </a:r>
+                    </a:p>
+                    <a:p>
+                      <a:r>
+                        <a:rPr lang="en-US" altLang="zh-CN" b="0" smtClean="0">
+                          <a:solidFill>
+                            <a:schemeClr val="tx1"/>
+                          </a:solidFill>
+                        </a:rPr>
+                        <a:t>print(driver.page_source,file = sources)</a:t>
+                      </a:r>
+                    </a:p>
+                  </a:txBody>
+                  <a:tcPr>
+                    <a:solidFill>
+                      <a:schemeClr val="accent4">
+                        <a:lumMod val="75000"/>
                       </a:schemeClr>
                     </a:solidFill>
                   </a:tcPr>

</xml_diff>

<commit_message>
update soulution with selenium control
</commit_message>
<xml_diff>
--- a/Solution_v2.0.pptx
+++ b/Solution_v2.0.pptx
@@ -5,7 +5,7 @@
     <p:sldMasterId id="2147483648" r:id="rId1"/>
   </p:sldMasterIdLst>
   <p:notesMasterIdLst>
-    <p:notesMasterId r:id="rId9"/>
+    <p:notesMasterId r:id="rId15"/>
   </p:notesMasterIdLst>
   <p:sldIdLst>
     <p:sldId id="256" r:id="rId2"/>
@@ -13,8 +13,14 @@
     <p:sldId id="258" r:id="rId4"/>
     <p:sldId id="260" r:id="rId5"/>
     <p:sldId id="261" r:id="rId6"/>
-    <p:sldId id="262" r:id="rId7"/>
-    <p:sldId id="263" r:id="rId8"/>
+    <p:sldId id="269" r:id="rId7"/>
+    <p:sldId id="262" r:id="rId8"/>
+    <p:sldId id="263" r:id="rId9"/>
+    <p:sldId id="265" r:id="rId10"/>
+    <p:sldId id="264" r:id="rId11"/>
+    <p:sldId id="266" r:id="rId12"/>
+    <p:sldId id="267" r:id="rId13"/>
+    <p:sldId id="268" r:id="rId14"/>
   </p:sldIdLst>
   <p:sldSz cx="12192000" cy="6858000"/>
   <p:notesSz cx="6858000" cy="9144000"/>
@@ -115,7 +121,18 @@
   </p:defaultTextStyle>
   <p:extLst>
     <p:ext uri="{EFAFB233-063F-42B5-8137-9DF3F51BA10A}">
-      <p15:sldGuideLst xmlns:p15="http://schemas.microsoft.com/office/powerpoint/2012/main"/>
+      <p15:sldGuideLst xmlns:p15="http://schemas.microsoft.com/office/powerpoint/2012/main">
+        <p15:guide id="1" orient="horz" pos="2160" userDrawn="1">
+          <p15:clr>
+            <a:srgbClr val="A4A3A4"/>
+          </p15:clr>
+        </p15:guide>
+        <p15:guide id="2" pos="3840" userDrawn="1">
+          <p15:clr>
+            <a:srgbClr val="A4A3A4"/>
+          </p15:clr>
+        </p15:guide>
+      </p15:sldGuideLst>
     </p:ext>
   </p:extLst>
 </p:presentation>
@@ -203,7 +220,7 @@
           <a:p>
             <a:fld id="{FA44945A-58D9-4E1D-9283-1714117EEBC5}" type="datetimeFigureOut">
               <a:rPr lang="zh-CN" altLang="en-US" smtClean="0"/>
-              <a:t>2019/7/23</a:t>
+              <a:t>2019/8/12</a:t>
             </a:fld>
             <a:endParaRPr lang="zh-CN" altLang="en-US"/>
           </a:p>
@@ -536,7 +553,7 @@
           <a:p>
             <a:fld id="{886385D1-9B9B-4740-BB85-395953B2DBD2}" type="slidenum">
               <a:rPr lang="zh-CN" altLang="en-US" smtClean="0"/>
-              <a:t>6</a:t>
+              <a:t>7</a:t>
             </a:fld>
             <a:endParaRPr lang="zh-CN" altLang="en-US"/>
           </a:p>
@@ -686,7 +703,7 @@
           <a:p>
             <a:fld id="{96F2EE66-317E-4C72-B2DB-1291871AF2EE}" type="datetimeFigureOut">
               <a:rPr lang="zh-CN" altLang="en-US" smtClean="0"/>
-              <a:t>2019/7/23</a:t>
+              <a:t>2019/8/12</a:t>
             </a:fld>
             <a:endParaRPr lang="zh-CN" altLang="en-US"/>
           </a:p>
@@ -856,7 +873,7 @@
           <a:p>
             <a:fld id="{96F2EE66-317E-4C72-B2DB-1291871AF2EE}" type="datetimeFigureOut">
               <a:rPr lang="zh-CN" altLang="en-US" smtClean="0"/>
-              <a:t>2019/7/23</a:t>
+              <a:t>2019/8/12</a:t>
             </a:fld>
             <a:endParaRPr lang="zh-CN" altLang="en-US"/>
           </a:p>
@@ -1036,7 +1053,7 @@
           <a:p>
             <a:fld id="{96F2EE66-317E-4C72-B2DB-1291871AF2EE}" type="datetimeFigureOut">
               <a:rPr lang="zh-CN" altLang="en-US" smtClean="0"/>
-              <a:t>2019/7/23</a:t>
+              <a:t>2019/8/12</a:t>
             </a:fld>
             <a:endParaRPr lang="zh-CN" altLang="en-US"/>
           </a:p>
@@ -1206,7 +1223,7 @@
           <a:p>
             <a:fld id="{96F2EE66-317E-4C72-B2DB-1291871AF2EE}" type="datetimeFigureOut">
               <a:rPr lang="zh-CN" altLang="en-US" smtClean="0"/>
-              <a:t>2019/7/23</a:t>
+              <a:t>2019/8/12</a:t>
             </a:fld>
             <a:endParaRPr lang="zh-CN" altLang="en-US"/>
           </a:p>
@@ -1452,7 +1469,7 @@
           <a:p>
             <a:fld id="{96F2EE66-317E-4C72-B2DB-1291871AF2EE}" type="datetimeFigureOut">
               <a:rPr lang="zh-CN" altLang="en-US" smtClean="0"/>
-              <a:t>2019/7/23</a:t>
+              <a:t>2019/8/12</a:t>
             </a:fld>
             <a:endParaRPr lang="zh-CN" altLang="en-US"/>
           </a:p>
@@ -1684,7 +1701,7 @@
           <a:p>
             <a:fld id="{96F2EE66-317E-4C72-B2DB-1291871AF2EE}" type="datetimeFigureOut">
               <a:rPr lang="zh-CN" altLang="en-US" smtClean="0"/>
-              <a:t>2019/7/23</a:t>
+              <a:t>2019/8/12</a:t>
             </a:fld>
             <a:endParaRPr lang="zh-CN" altLang="en-US"/>
           </a:p>
@@ -2051,7 +2068,7 @@
           <a:p>
             <a:fld id="{96F2EE66-317E-4C72-B2DB-1291871AF2EE}" type="datetimeFigureOut">
               <a:rPr lang="zh-CN" altLang="en-US" smtClean="0"/>
-              <a:t>2019/7/23</a:t>
+              <a:t>2019/8/12</a:t>
             </a:fld>
             <a:endParaRPr lang="zh-CN" altLang="en-US"/>
           </a:p>
@@ -2169,7 +2186,7 @@
           <a:p>
             <a:fld id="{96F2EE66-317E-4C72-B2DB-1291871AF2EE}" type="datetimeFigureOut">
               <a:rPr lang="zh-CN" altLang="en-US" smtClean="0"/>
-              <a:t>2019/7/23</a:t>
+              <a:t>2019/8/12</a:t>
             </a:fld>
             <a:endParaRPr lang="zh-CN" altLang="en-US"/>
           </a:p>
@@ -2264,7 +2281,7 @@
           <a:p>
             <a:fld id="{96F2EE66-317E-4C72-B2DB-1291871AF2EE}" type="datetimeFigureOut">
               <a:rPr lang="zh-CN" altLang="en-US" smtClean="0"/>
-              <a:t>2019/7/23</a:t>
+              <a:t>2019/8/12</a:t>
             </a:fld>
             <a:endParaRPr lang="zh-CN" altLang="en-US"/>
           </a:p>
@@ -2541,7 +2558,7 @@
           <a:p>
             <a:fld id="{96F2EE66-317E-4C72-B2DB-1291871AF2EE}" type="datetimeFigureOut">
               <a:rPr lang="zh-CN" altLang="en-US" smtClean="0"/>
-              <a:t>2019/7/23</a:t>
+              <a:t>2019/8/12</a:t>
             </a:fld>
             <a:endParaRPr lang="zh-CN" altLang="en-US"/>
           </a:p>
@@ -2794,7 +2811,7 @@
           <a:p>
             <a:fld id="{96F2EE66-317E-4C72-B2DB-1291871AF2EE}" type="datetimeFigureOut">
               <a:rPr lang="zh-CN" altLang="en-US" smtClean="0"/>
-              <a:t>2019/7/23</a:t>
+              <a:t>2019/8/12</a:t>
             </a:fld>
             <a:endParaRPr lang="zh-CN" altLang="en-US"/>
           </a:p>
@@ -3007,7 +3024,7 @@
           <a:p>
             <a:fld id="{96F2EE66-317E-4C72-B2DB-1291871AF2EE}" type="datetimeFigureOut">
               <a:rPr lang="zh-CN" altLang="en-US" smtClean="0"/>
-              <a:t>2019/7/23</a:t>
+              <a:t>2019/8/12</a:t>
             </a:fld>
             <a:endParaRPr lang="zh-CN" altLang="en-US"/>
           </a:p>
@@ -3534,6 +3551,745 @@
 </p:sld>
 </file>
 
+<file path=ppt/slides/slide10.xml><?xml version="1.0" encoding="utf-8"?>
+<p:sld xmlns:a="http://schemas.openxmlformats.org/drawingml/2006/main" xmlns:r="http://schemas.openxmlformats.org/officeDocument/2006/relationships" xmlns:p="http://schemas.openxmlformats.org/presentationml/2006/main">
+  <p:cSld>
+    <p:spTree>
+      <p:nvGrpSpPr>
+        <p:cNvPr id="1" name=""/>
+        <p:cNvGrpSpPr/>
+        <p:nvPr/>
+      </p:nvGrpSpPr>
+      <p:grpSpPr>
+        <a:xfrm>
+          <a:off x="0" y="0"/>
+          <a:ext cx="0" cy="0"/>
+          <a:chOff x="0" y="0"/>
+          <a:chExt cx="0" cy="0"/>
+        </a:xfrm>
+      </p:grpSpPr>
+      <p:sp>
+        <p:nvSpPr>
+          <p:cNvPr id="2" name="标题 1"/>
+          <p:cNvSpPr>
+            <a:spLocks noGrp="1"/>
+          </p:cNvSpPr>
+          <p:nvPr>
+            <p:ph type="title"/>
+          </p:nvPr>
+        </p:nvSpPr>
+        <p:spPr/>
+        <p:txBody>
+          <a:bodyPr/>
+          <a:lstStyle/>
+          <a:p>
+            <a:r>
+              <a:rPr lang="en-US" altLang="zh-CN" smtClean="0"/>
+              <a:t>NEXT</a:t>
+            </a:r>
+            <a:endParaRPr lang="zh-CN" altLang="en-US"/>
+          </a:p>
+        </p:txBody>
+      </p:sp>
+      <p:sp>
+        <p:nvSpPr>
+          <p:cNvPr id="3" name="内容占位符 2"/>
+          <p:cNvSpPr>
+            <a:spLocks noGrp="1"/>
+          </p:cNvSpPr>
+          <p:nvPr>
+            <p:ph idx="1"/>
+          </p:nvPr>
+        </p:nvSpPr>
+        <p:spPr>
+          <a:xfrm>
+            <a:off x="838200" y="1864261"/>
+            <a:ext cx="10515600" cy="4351338"/>
+          </a:xfrm>
+        </p:spPr>
+        <p:txBody>
+          <a:bodyPr/>
+          <a:lstStyle/>
+          <a:p>
+            <a:r>
+              <a:rPr lang="zh-CN" altLang="en-US" smtClean="0"/>
+              <a:t>每隔</a:t>
+            </a:r>
+            <a:r>
+              <a:rPr lang="en-US" altLang="zh-CN" smtClean="0"/>
+              <a:t>random(30,90)s</a:t>
+            </a:r>
+            <a:r>
+              <a:rPr lang="zh-CN" altLang="en-US" smtClean="0"/>
+              <a:t>进行一次图片下载</a:t>
+            </a:r>
+            <a:endParaRPr lang="en-US" altLang="zh-CN" smtClean="0"/>
+          </a:p>
+          <a:p>
+            <a:r>
+              <a:rPr lang="zh-CN" altLang="zh-CN"/>
+              <a:t>模拟指针向下滑动来获取</a:t>
+            </a:r>
+            <a:r>
+              <a:rPr lang="zh-CN" altLang="zh-CN" smtClean="0"/>
+              <a:t>更多的图片过程</a:t>
+            </a:r>
+            <a:endParaRPr lang="zh-CN" altLang="en-US"/>
+          </a:p>
+        </p:txBody>
+      </p:sp>
+    </p:spTree>
+    <p:extLst>
+      <p:ext uri="{BB962C8B-B14F-4D97-AF65-F5344CB8AC3E}">
+        <p14:creationId xmlns:p14="http://schemas.microsoft.com/office/powerpoint/2010/main" val="4172207242"/>
+      </p:ext>
+    </p:extLst>
+  </p:cSld>
+  <p:clrMapOvr>
+    <a:masterClrMapping/>
+  </p:clrMapOvr>
+</p:sld>
+</file>
+
+<file path=ppt/slides/slide11.xml><?xml version="1.0" encoding="utf-8"?>
+<p:sld xmlns:a="http://schemas.openxmlformats.org/drawingml/2006/main" xmlns:r="http://schemas.openxmlformats.org/officeDocument/2006/relationships" xmlns:p="http://schemas.openxmlformats.org/presentationml/2006/main">
+  <p:cSld>
+    <p:spTree>
+      <p:nvGrpSpPr>
+        <p:cNvPr id="1" name=""/>
+        <p:cNvGrpSpPr/>
+        <p:nvPr/>
+      </p:nvGrpSpPr>
+      <p:grpSpPr>
+        <a:xfrm>
+          <a:off x="0" y="0"/>
+          <a:ext cx="0" cy="0"/>
+          <a:chOff x="0" y="0"/>
+          <a:chExt cx="0" cy="0"/>
+        </a:xfrm>
+      </p:grpSpPr>
+      <p:sp>
+        <p:nvSpPr>
+          <p:cNvPr id="2" name="标题 1"/>
+          <p:cNvSpPr>
+            <a:spLocks noGrp="1"/>
+          </p:cNvSpPr>
+          <p:nvPr>
+            <p:ph type="title"/>
+          </p:nvPr>
+        </p:nvSpPr>
+        <p:spPr/>
+        <p:txBody>
+          <a:bodyPr/>
+          <a:lstStyle/>
+          <a:p>
+            <a:r>
+              <a:rPr lang="en-US" altLang="zh-CN" smtClean="0"/>
+              <a:t>Tips</a:t>
+            </a:r>
+            <a:endParaRPr lang="zh-CN" altLang="en-US"/>
+          </a:p>
+        </p:txBody>
+      </p:sp>
+      <p:sp>
+        <p:nvSpPr>
+          <p:cNvPr id="3" name="内容占位符 2"/>
+          <p:cNvSpPr>
+            <a:spLocks noGrp="1"/>
+          </p:cNvSpPr>
+          <p:nvPr>
+            <p:ph idx="1"/>
+          </p:nvPr>
+        </p:nvSpPr>
+        <p:spPr>
+          <a:xfrm>
+            <a:off x="838200" y="1825625"/>
+            <a:ext cx="10515600" cy="4875426"/>
+          </a:xfrm>
+        </p:spPr>
+        <p:txBody>
+          <a:bodyPr>
+            <a:normAutofit/>
+          </a:bodyPr>
+          <a:lstStyle/>
+          <a:p>
+            <a:r>
+              <a:rPr lang="zh-CN" altLang="zh-CN"/>
+              <a:t>利用字符串</a:t>
+            </a:r>
+            <a:r>
+              <a:rPr lang="zh-CN" altLang="zh-CN" smtClean="0"/>
+              <a:t>的</a:t>
+            </a:r>
+            <a:r>
+              <a:rPr lang="en-US" altLang="zh-CN" smtClean="0"/>
+              <a:t>string.strip</a:t>
+            </a:r>
+            <a:r>
+              <a:rPr lang="en-US" altLang="zh-CN"/>
+              <a:t>()</a:t>
+            </a:r>
+            <a:r>
+              <a:rPr lang="zh-CN" altLang="zh-CN"/>
+              <a:t>去掉空格和</a:t>
+            </a:r>
+            <a:r>
+              <a:rPr lang="zh-CN" altLang="zh-CN" smtClean="0"/>
+              <a:t>换行</a:t>
+            </a:r>
+            <a:endParaRPr lang="en-US" altLang="zh-CN" smtClean="0"/>
+          </a:p>
+          <a:p>
+            <a:r>
+              <a:rPr lang="zh-CN" altLang="en-US" smtClean="0"/>
+              <a:t>成功的示例程序</a:t>
+            </a:r>
+            <a:endParaRPr lang="en-US" altLang="zh-CN" smtClean="0"/>
+          </a:p>
+          <a:p>
+            <a:r>
+              <a:rPr lang="en-US" altLang="zh-CN" smtClean="0"/>
+              <a:t>Chrome</a:t>
+            </a:r>
+            <a:r>
+              <a:rPr lang="zh-CN" altLang="en-US" smtClean="0"/>
+              <a:t>中</a:t>
+            </a:r>
+            <a:r>
+              <a:rPr lang="en-US" altLang="zh-CN" smtClean="0"/>
+              <a:t>F12</a:t>
+            </a:r>
+            <a:r>
+              <a:rPr lang="zh-CN" altLang="en-US" smtClean="0"/>
+              <a:t>开发者模式中</a:t>
+            </a:r>
+            <a:r>
+              <a:rPr lang="en-US" altLang="zh-CN" smtClean="0"/>
+              <a:t>,element</a:t>
+            </a:r>
+            <a:r>
+              <a:rPr lang="zh-CN" altLang="en-US" smtClean="0"/>
+              <a:t>中</a:t>
+            </a:r>
+            <a:r>
+              <a:rPr lang="en-US" altLang="zh-CN" smtClean="0"/>
+              <a:t>xhr</a:t>
+            </a:r>
+            <a:r>
+              <a:rPr lang="zh-CN" altLang="en-US" smtClean="0"/>
+              <a:t>类型</a:t>
+            </a:r>
+            <a:r>
+              <a:rPr lang="zh-CN" altLang="zh-CN" smtClean="0"/>
+              <a:t>中</a:t>
+            </a:r>
+            <a:r>
+              <a:rPr lang="zh-CN" altLang="zh-CN"/>
+              <a:t>可以找到有关于</a:t>
+            </a:r>
+            <a:r>
+              <a:rPr lang="en-US" altLang="zh-CN"/>
+              <a:t>post</a:t>
+            </a:r>
+            <a:r>
+              <a:rPr lang="zh-CN" altLang="zh-CN"/>
+              <a:t>的信息</a:t>
+            </a:r>
+            <a:r>
+              <a:rPr lang="en-US" altLang="zh-CN"/>
+              <a:t> xhr</a:t>
+            </a:r>
+            <a:r>
+              <a:rPr lang="zh-CN" altLang="zh-CN"/>
+              <a:t>的全称是</a:t>
+            </a:r>
+            <a:r>
+              <a:rPr lang="en-US" altLang="zh-CN"/>
+              <a:t> XML https </a:t>
+            </a:r>
+            <a:r>
+              <a:rPr lang="en-US" altLang="zh-CN" smtClean="0"/>
+              <a:t>requests</a:t>
+            </a:r>
+          </a:p>
+          <a:p>
+            <a:r>
+              <a:rPr lang="zh-CN" altLang="zh-CN"/>
+              <a:t>在</a:t>
+            </a:r>
+            <a:r>
+              <a:rPr lang="en-US" altLang="zh-CN"/>
+              <a:t>log</a:t>
+            </a:r>
+            <a:r>
+              <a:rPr lang="zh-CN" altLang="zh-CN"/>
+              <a:t>中可以找到一个</a:t>
+            </a:r>
+            <a:r>
+              <a:rPr lang="en-US" altLang="zh-CN"/>
+              <a:t>login</a:t>
+            </a:r>
+            <a:r>
+              <a:rPr lang="zh-CN" altLang="zh-CN"/>
+              <a:t>的文件，里面可以找到关于用户</a:t>
+            </a:r>
+            <a:r>
+              <a:rPr lang="en-US" altLang="zh-CN"/>
+              <a:t>cookies</a:t>
+            </a:r>
+            <a:r>
+              <a:rPr lang="zh-CN" altLang="zh-CN"/>
+              <a:t>和</a:t>
+            </a:r>
+            <a:r>
+              <a:rPr lang="en-US" altLang="zh-CN"/>
+              <a:t>username\password</a:t>
+            </a:r>
+            <a:r>
+              <a:rPr lang="zh-CN" altLang="zh-CN"/>
+              <a:t>相关的字符，将有助于填在</a:t>
+            </a:r>
+            <a:r>
+              <a:rPr lang="en-US" altLang="zh-CN"/>
+              <a:t>requests.get()</a:t>
+            </a:r>
+            <a:r>
+              <a:rPr lang="zh-CN" altLang="zh-CN"/>
+              <a:t>中的</a:t>
+            </a:r>
+            <a:r>
+              <a:rPr lang="en-US" altLang="zh-CN"/>
+              <a:t>data</a:t>
+            </a:r>
+            <a:r>
+              <a:rPr lang="zh-CN" altLang="zh-CN" smtClean="0"/>
+              <a:t>参数</a:t>
+            </a:r>
+            <a:endParaRPr lang="en-US" altLang="zh-CN" smtClean="0"/>
+          </a:p>
+          <a:p>
+            <a:r>
+              <a:rPr lang="en-US" altLang="zh-CN" u="sng" smtClean="0">
+                <a:hlinkClick r:id="rId3"/>
+              </a:rPr>
+              <a:t>Python</a:t>
+            </a:r>
+            <a:r>
+              <a:rPr lang="en-US" altLang="zh-CN" u="sng">
+                <a:hlinkClick r:id="rId3"/>
+              </a:rPr>
+              <a:t>的requests模块的例子很详细</a:t>
+            </a:r>
+            <a:endParaRPr lang="zh-CN" altLang="zh-CN"/>
+          </a:p>
+          <a:p>
+            <a:r>
+              <a:rPr lang="en-US" altLang="zh-CN" u="sng">
+                <a:hlinkClick r:id="rId4"/>
+              </a:rPr>
+              <a:t>同样的抓取网页遇到的源码和网页实时代码不一样的问题</a:t>
+            </a:r>
+            <a:endParaRPr lang="zh-CN" altLang="zh-CN"/>
+          </a:p>
+          <a:p>
+            <a:endParaRPr lang="zh-CN" altLang="zh-CN"/>
+          </a:p>
+          <a:p>
+            <a:endParaRPr lang="en-US" altLang="zh-CN" smtClean="0"/>
+          </a:p>
+          <a:p>
+            <a:endParaRPr lang="zh-CN" altLang="zh-CN"/>
+          </a:p>
+          <a:p>
+            <a:endParaRPr lang="zh-CN" altLang="en-US"/>
+          </a:p>
+        </p:txBody>
+      </p:sp>
+      <p:graphicFrame>
+        <p:nvGraphicFramePr>
+          <p:cNvPr id="4" name="对象 3"/>
+          <p:cNvGraphicFramePr>
+            <a:graphicFrameLocks noChangeAspect="1"/>
+          </p:cNvGraphicFramePr>
+          <p:nvPr>
+            <p:extLst>
+              <p:ext uri="{D42A27DB-BD31-4B8C-83A1-F6EECF244321}">
+                <p14:modId xmlns:p14="http://schemas.microsoft.com/office/powerpoint/2010/main" val="3099458726"/>
+              </p:ext>
+            </p:extLst>
+          </p:nvPr>
+        </p:nvGraphicFramePr>
+        <p:xfrm>
+          <a:off x="3663287" y="2256232"/>
+          <a:ext cx="1054100" cy="711200"/>
+        </p:xfrm>
+        <a:graphic>
+          <a:graphicData uri="http://schemas.openxmlformats.org/presentationml/2006/ole">
+            <mc:AlternateContent xmlns:mc="http://schemas.openxmlformats.org/markup-compatibility/2006">
+              <mc:Choice xmlns:v="urn:schemas-microsoft-com:vml" Requires="v">
+                <p:oleObj spid="_x0000_s2068" name="包装程序外壳对象" showAsIcon="1" r:id="rId5" imgW="1054440" imgH="711360" progId="Package">
+                  <p:embed/>
+                </p:oleObj>
+              </mc:Choice>
+              <mc:Fallback>
+                <p:oleObj name="包装程序外壳对象" showAsIcon="1" r:id="rId5" imgW="1054440" imgH="711360" progId="Package">
+                  <p:embed/>
+                  <p:pic>
+                    <p:nvPicPr>
+                      <p:cNvPr id="6" name="对象 5"/>
+                      <p:cNvPicPr/>
+                      <p:nvPr/>
+                    </p:nvPicPr>
+                    <p:blipFill>
+                      <a:blip r:embed="rId6"/>
+                      <a:stretch>
+                        <a:fillRect/>
+                      </a:stretch>
+                    </p:blipFill>
+                    <p:spPr>
+                      <a:xfrm>
+                        <a:off x="3663287" y="2256232"/>
+                        <a:ext cx="1054100" cy="711200"/>
+                      </a:xfrm>
+                      <a:prstGeom prst="rect">
+                        <a:avLst/>
+                      </a:prstGeom>
+                    </p:spPr>
+                  </p:pic>
+                </p:oleObj>
+              </mc:Fallback>
+            </mc:AlternateContent>
+          </a:graphicData>
+        </a:graphic>
+      </p:graphicFrame>
+    </p:spTree>
+    <p:extLst>
+      <p:ext uri="{BB962C8B-B14F-4D97-AF65-F5344CB8AC3E}">
+        <p14:creationId xmlns:p14="http://schemas.microsoft.com/office/powerpoint/2010/main" val="4109820743"/>
+      </p:ext>
+    </p:extLst>
+  </p:cSld>
+  <p:clrMapOvr>
+    <a:masterClrMapping/>
+  </p:clrMapOvr>
+</p:sld>
+</file>
+
+<file path=ppt/slides/slide12.xml><?xml version="1.0" encoding="utf-8"?>
+<p:sld xmlns:a="http://schemas.openxmlformats.org/drawingml/2006/main" xmlns:r="http://schemas.openxmlformats.org/officeDocument/2006/relationships" xmlns:p="http://schemas.openxmlformats.org/presentationml/2006/main">
+  <p:cSld>
+    <p:spTree>
+      <p:nvGrpSpPr>
+        <p:cNvPr id="1" name=""/>
+        <p:cNvGrpSpPr/>
+        <p:nvPr/>
+      </p:nvGrpSpPr>
+      <p:grpSpPr>
+        <a:xfrm>
+          <a:off x="0" y="0"/>
+          <a:ext cx="0" cy="0"/>
+          <a:chOff x="0" y="0"/>
+          <a:chExt cx="0" cy="0"/>
+        </a:xfrm>
+      </p:grpSpPr>
+      <p:sp>
+        <p:nvSpPr>
+          <p:cNvPr id="3" name="内容占位符 2"/>
+          <p:cNvSpPr>
+            <a:spLocks noGrp="1"/>
+          </p:cNvSpPr>
+          <p:nvPr>
+            <p:ph idx="1"/>
+          </p:nvPr>
+        </p:nvSpPr>
+        <p:spPr/>
+        <p:txBody>
+          <a:bodyPr/>
+          <a:lstStyle/>
+          <a:p>
+            <a:r>
+              <a:rPr lang="en-US" altLang="zh-CN"/>
+              <a:t>format_str </a:t>
+            </a:r>
+            <a:r>
+              <a:rPr lang="en-US" altLang="zh-CN" smtClean="0"/>
+              <a:t>= content.prettify()</a:t>
+            </a:r>
+            <a:r>
+              <a:rPr lang="zh-CN" altLang="en-US" smtClean="0"/>
+              <a:t>可以将</a:t>
+            </a:r>
+            <a:r>
+              <a:rPr lang="en-US" altLang="zh-CN" smtClean="0"/>
+              <a:t>content</a:t>
+            </a:r>
+            <a:r>
+              <a:rPr lang="zh-CN" altLang="en-US" smtClean="0"/>
+              <a:t>中的</a:t>
+            </a:r>
+            <a:r>
+              <a:rPr lang="en-US" altLang="zh-CN" smtClean="0"/>
+              <a:t>Html</a:t>
+            </a:r>
+            <a:r>
+              <a:rPr lang="zh-CN" altLang="en-US" smtClean="0"/>
+              <a:t>内容格式化</a:t>
+            </a:r>
+            <a:endParaRPr lang="en-US" altLang="zh-CN" smtClean="0"/>
+          </a:p>
+          <a:p>
+            <a:r>
+              <a:rPr lang="zh-CN" altLang="en-US" smtClean="0"/>
+              <a:t>正则表达式</a:t>
+            </a:r>
+            <a:endParaRPr lang="en-US" altLang="zh-CN" smtClean="0"/>
+          </a:p>
+          <a:p>
+            <a:pPr lvl="0"/>
+            <a:r>
+              <a:rPr lang="en-US" altLang="zh-CN"/>
+              <a:t>Headers</a:t>
+            </a:r>
+            <a:r>
+              <a:rPr lang="zh-CN" altLang="zh-CN"/>
+              <a:t>头文件不能是字符串，必须是字典</a:t>
+            </a:r>
+            <a:r>
+              <a:rPr lang="en-US" altLang="zh-CN"/>
+              <a:t> { }</a:t>
+            </a:r>
+            <a:endParaRPr lang="zh-CN" altLang="zh-CN"/>
+          </a:p>
+          <a:p>
+            <a:pPr lvl="0"/>
+            <a:r>
+              <a:rPr lang="zh-CN" altLang="zh-CN"/>
+              <a:t>如果出现</a:t>
+            </a:r>
+            <a:r>
+              <a:rPr lang="en-US" altLang="zh-CN"/>
+              <a:t>‘unindent does not match any outer indentation level’</a:t>
+            </a:r>
+            <a:r>
+              <a:rPr lang="zh-CN" altLang="zh-CN"/>
+              <a:t>这种格式问题，十分有可能在使用缩进的时用</a:t>
+            </a:r>
+            <a:r>
+              <a:rPr lang="zh-CN" altLang="en-US"/>
+              <a:t>了</a:t>
+            </a:r>
+            <a:r>
+              <a:rPr lang="en-US" altLang="zh-CN"/>
+              <a:t>TAB</a:t>
+            </a:r>
+            <a:r>
+              <a:rPr lang="zh-CN" altLang="zh-CN"/>
+              <a:t>键导致了</a:t>
+            </a:r>
+            <a:r>
+              <a:rPr lang="en-US" altLang="zh-CN"/>
+              <a:t>4</a:t>
+            </a:r>
+            <a:r>
+              <a:rPr lang="zh-CN" altLang="zh-CN"/>
+              <a:t>个空格和</a:t>
+            </a:r>
+            <a:r>
+              <a:rPr lang="en-US" altLang="zh-CN"/>
+              <a:t>TAB</a:t>
+            </a:r>
+            <a:r>
+              <a:rPr lang="zh-CN" altLang="zh-CN"/>
+              <a:t>键的不同，所以最好使用</a:t>
+            </a:r>
+            <a:r>
+              <a:rPr lang="en-US" altLang="zh-CN"/>
+              <a:t>4</a:t>
+            </a:r>
+            <a:r>
+              <a:rPr lang="zh-CN" altLang="zh-CN"/>
+              <a:t>个空格在</a:t>
+            </a:r>
+            <a:r>
+              <a:rPr lang="en-US" altLang="zh-CN"/>
+              <a:t>Python</a:t>
+            </a:r>
+            <a:r>
+              <a:rPr lang="zh-CN" altLang="zh-CN"/>
+              <a:t>中更保险</a:t>
+            </a:r>
+          </a:p>
+          <a:p>
+            <a:endParaRPr lang="zh-CN" altLang="en-US"/>
+          </a:p>
+        </p:txBody>
+      </p:sp>
+      <p:sp>
+        <p:nvSpPr>
+          <p:cNvPr id="5" name="标题 1"/>
+          <p:cNvSpPr>
+            <a:spLocks noGrp="1"/>
+          </p:cNvSpPr>
+          <p:nvPr>
+            <p:ph type="title"/>
+          </p:nvPr>
+        </p:nvSpPr>
+        <p:spPr>
+          <a:xfrm>
+            <a:off x="838200" y="365125"/>
+            <a:ext cx="10515600" cy="1325563"/>
+          </a:xfrm>
+        </p:spPr>
+        <p:txBody>
+          <a:bodyPr/>
+          <a:lstStyle/>
+          <a:p>
+            <a:r>
+              <a:rPr lang="en-US" altLang="zh-CN" smtClean="0"/>
+              <a:t>Tips</a:t>
+            </a:r>
+            <a:endParaRPr lang="zh-CN" altLang="en-US"/>
+          </a:p>
+        </p:txBody>
+      </p:sp>
+      <p:graphicFrame>
+        <p:nvGraphicFramePr>
+          <p:cNvPr id="2" name="对象 1"/>
+          <p:cNvGraphicFramePr>
+            <a:graphicFrameLocks noChangeAspect="1"/>
+          </p:cNvGraphicFramePr>
+          <p:nvPr>
+            <p:extLst>
+              <p:ext uri="{D42A27DB-BD31-4B8C-83A1-F6EECF244321}">
+                <p14:modId xmlns:p14="http://schemas.microsoft.com/office/powerpoint/2010/main" val="4035631408"/>
+              </p:ext>
+            </p:extLst>
+          </p:nvPr>
+        </p:nvGraphicFramePr>
+        <p:xfrm>
+          <a:off x="2574974" y="2255887"/>
+          <a:ext cx="1752600" cy="711200"/>
+        </p:xfrm>
+        <a:graphic>
+          <a:graphicData uri="http://schemas.openxmlformats.org/presentationml/2006/ole">
+            <mc:AlternateContent xmlns:mc="http://schemas.openxmlformats.org/markup-compatibility/2006">
+              <mc:Choice xmlns:v="urn:schemas-microsoft-com:vml" Requires="v">
+                <p:oleObj spid="_x0000_s3084" name="包装程序外壳对象" showAsIcon="1" r:id="rId3" imgW="1752840" imgH="711360" progId="Package">
+                  <p:embed/>
+                </p:oleObj>
+              </mc:Choice>
+              <mc:Fallback>
+                <p:oleObj name="包装程序外壳对象" showAsIcon="1" r:id="rId3" imgW="1752840" imgH="711360" progId="Package">
+                  <p:embed/>
+                  <p:pic>
+                    <p:nvPicPr>
+                      <p:cNvPr id="0" name=""/>
+                      <p:cNvPicPr/>
+                      <p:nvPr/>
+                    </p:nvPicPr>
+                    <p:blipFill>
+                      <a:blip r:embed="rId4"/>
+                      <a:stretch>
+                        <a:fillRect/>
+                      </a:stretch>
+                    </p:blipFill>
+                    <p:spPr>
+                      <a:xfrm>
+                        <a:off x="2574974" y="2255887"/>
+                        <a:ext cx="1752600" cy="711200"/>
+                      </a:xfrm>
+                      <a:prstGeom prst="rect">
+                        <a:avLst/>
+                      </a:prstGeom>
+                    </p:spPr>
+                  </p:pic>
+                </p:oleObj>
+              </mc:Fallback>
+            </mc:AlternateContent>
+          </a:graphicData>
+        </a:graphic>
+      </p:graphicFrame>
+    </p:spTree>
+    <p:extLst>
+      <p:ext uri="{BB962C8B-B14F-4D97-AF65-F5344CB8AC3E}">
+        <p14:creationId xmlns:p14="http://schemas.microsoft.com/office/powerpoint/2010/main" val="972770141"/>
+      </p:ext>
+    </p:extLst>
+  </p:cSld>
+  <p:clrMapOvr>
+    <a:masterClrMapping/>
+  </p:clrMapOvr>
+</p:sld>
+</file>
+
+<file path=ppt/slides/slide13.xml><?xml version="1.0" encoding="utf-8"?>
+<p:sld xmlns:a="http://schemas.openxmlformats.org/drawingml/2006/main" xmlns:r="http://schemas.openxmlformats.org/officeDocument/2006/relationships" xmlns:p="http://schemas.openxmlformats.org/presentationml/2006/main">
+  <p:cSld>
+    <p:spTree>
+      <p:nvGrpSpPr>
+        <p:cNvPr id="1" name=""/>
+        <p:cNvGrpSpPr/>
+        <p:nvPr/>
+      </p:nvGrpSpPr>
+      <p:grpSpPr>
+        <a:xfrm>
+          <a:off x="0" y="0"/>
+          <a:ext cx="0" cy="0"/>
+          <a:chOff x="0" y="0"/>
+          <a:chExt cx="0" cy="0"/>
+        </a:xfrm>
+      </p:grpSpPr>
+      <p:sp>
+        <p:nvSpPr>
+          <p:cNvPr id="2" name="标题 1"/>
+          <p:cNvSpPr>
+            <a:spLocks noGrp="1"/>
+          </p:cNvSpPr>
+          <p:nvPr>
+            <p:ph type="title"/>
+          </p:nvPr>
+        </p:nvSpPr>
+        <p:spPr/>
+        <p:txBody>
+          <a:bodyPr/>
+          <a:lstStyle/>
+          <a:p>
+            <a:endParaRPr lang="zh-CN" altLang="en-US"/>
+          </a:p>
+        </p:txBody>
+      </p:sp>
+      <p:sp>
+        <p:nvSpPr>
+          <p:cNvPr id="5" name="内容占位符 4"/>
+          <p:cNvSpPr>
+            <a:spLocks noGrp="1"/>
+          </p:cNvSpPr>
+          <p:nvPr>
+            <p:ph idx="1"/>
+          </p:nvPr>
+        </p:nvSpPr>
+        <p:spPr/>
+        <p:txBody>
+          <a:bodyPr/>
+          <a:lstStyle/>
+          <a:p>
+            <a:endParaRPr lang="zh-CN" altLang="en-US"/>
+          </a:p>
+        </p:txBody>
+      </p:sp>
+    </p:spTree>
+    <p:extLst>
+      <p:ext uri="{BB962C8B-B14F-4D97-AF65-F5344CB8AC3E}">
+        <p14:creationId xmlns:p14="http://schemas.microsoft.com/office/powerpoint/2010/main" val="3563061500"/>
+      </p:ext>
+    </p:extLst>
+  </p:cSld>
+  <p:clrMapOvr>
+    <a:masterClrMapping/>
+  </p:clrMapOvr>
+</p:sld>
+</file>
+
 <file path=ppt/slides/slide2.xml><?xml version="1.0" encoding="utf-8"?>
 <p:sld xmlns:a="http://schemas.openxmlformats.org/drawingml/2006/main" xmlns:r="http://schemas.openxmlformats.org/officeDocument/2006/relationships" xmlns:p="http://schemas.openxmlformats.org/presentationml/2006/main">
   <p:cSld>
@@ -3561,7 +4317,12 @@
             <p:ph type="title"/>
           </p:nvPr>
         </p:nvSpPr>
-        <p:spPr/>
+        <p:spPr>
+          <a:xfrm>
+            <a:off x="968990" y="341194"/>
+            <a:ext cx="8323997" cy="994652"/>
+          </a:xfrm>
+        </p:spPr>
         <p:txBody>
           <a:bodyPr/>
           <a:lstStyle/>
@@ -3783,7 +4544,12 @@
             <p:ph type="title"/>
           </p:nvPr>
         </p:nvSpPr>
-        <p:spPr/>
+        <p:spPr>
+          <a:xfrm>
+            <a:off x="968990" y="378772"/>
+            <a:ext cx="9770660" cy="876821"/>
+          </a:xfrm>
+        </p:spPr>
         <p:txBody>
           <a:bodyPr/>
           <a:lstStyle/>
@@ -3817,103 +4583,11 @@
           <a:p>
             <a:r>
               <a:rPr lang="zh-CN" altLang="en-US" smtClean="0"/>
-              <a:t>在</a:t>
-            </a:r>
-            <a:r>
-              <a:rPr lang="en-US" altLang="zh-CN" smtClean="0"/>
-              <a:t>Python</a:t>
-            </a:r>
-            <a:r>
-              <a:rPr lang="zh-CN" altLang="en-US" smtClean="0"/>
-              <a:t>中可以使用</a:t>
-            </a:r>
-            <a:r>
-              <a:rPr lang="en-US" altLang="zh-CN" smtClean="0"/>
-              <a:t>requests.post()</a:t>
-            </a:r>
-            <a:r>
-              <a:rPr lang="zh-CN" altLang="en-US" smtClean="0"/>
-              <a:t>来将自己的登录信息提交到微博上，获取到自己的</a:t>
-            </a:r>
-            <a:r>
-              <a:rPr lang="en-US" altLang="zh-CN" smtClean="0"/>
-              <a:t>cookies,</a:t>
-            </a:r>
-            <a:r>
-              <a:rPr lang="zh-CN" altLang="en-US" smtClean="0"/>
-              <a:t>在将其</a:t>
-            </a:r>
-            <a:r>
-              <a:rPr lang="en-US" altLang="zh-CN" smtClean="0"/>
-              <a:t>reqeust.get()</a:t>
-            </a:r>
-            <a:r>
-              <a:rPr lang="zh-CN" altLang="en-US" smtClean="0"/>
-              <a:t>来获取网页</a:t>
-            </a:r>
-            <a:endParaRPr lang="en-US" altLang="zh-CN" smtClean="0"/>
-          </a:p>
-          <a:p>
-            <a:r>
-              <a:rPr lang="zh-CN" altLang="en-US" smtClean="0"/>
-              <a:t>可使用</a:t>
-            </a:r>
-            <a:r>
-              <a:rPr lang="en-US" altLang="zh-CN" smtClean="0"/>
-              <a:t>Session</a:t>
-            </a:r>
-            <a:r>
-              <a:rPr lang="zh-CN" altLang="en-US" smtClean="0"/>
-              <a:t>模块自动重复使用</a:t>
-            </a:r>
-            <a:r>
-              <a:rPr lang="en-US" altLang="zh-CN" smtClean="0"/>
-              <a:t>cookies</a:t>
-            </a:r>
-          </a:p>
-          <a:p>
-            <a:r>
-              <a:rPr lang="zh-CN" altLang="en-US" smtClean="0"/>
-              <a:t>一个</a:t>
-            </a:r>
-            <a:r>
-              <a:rPr lang="en-US" altLang="zh-CN" smtClean="0"/>
-              <a:t>cookies</a:t>
-            </a:r>
-            <a:r>
-              <a:rPr lang="zh-CN" altLang="en-US" smtClean="0"/>
-              <a:t>不可重复使用过多，否则会被</a:t>
-            </a:r>
-            <a:r>
-              <a:rPr lang="en-US" altLang="zh-CN" smtClean="0"/>
-              <a:t>Ban,</a:t>
-            </a:r>
-            <a:r>
-              <a:rPr lang="zh-CN" altLang="en-US" smtClean="0"/>
-              <a:t>所以在</a:t>
-            </a:r>
-            <a:r>
-              <a:rPr lang="en-US" altLang="zh-CN" smtClean="0"/>
-              <a:t>Raspberry</a:t>
-            </a:r>
-            <a:r>
-              <a:rPr lang="zh-CN" altLang="en-US" smtClean="0"/>
-              <a:t>上设置下载一个图片以后</a:t>
-            </a:r>
-            <a:r>
-              <a:rPr lang="en-US" altLang="zh-CN" smtClean="0"/>
-              <a:t>sleep1min</a:t>
-            </a:r>
-            <a:r>
-              <a:rPr lang="zh-CN" altLang="en-US" smtClean="0"/>
-              <a:t>后在下载</a:t>
-            </a:r>
-            <a:endParaRPr lang="en-US" altLang="zh-CN" smtClean="0"/>
-          </a:p>
-          <a:p>
-            <a:r>
-              <a:rPr lang="zh-CN" altLang="en-US" smtClean="0"/>
-              <a:t>由于微博采用了</a:t>
+              <a:t>由于</a:t>
+            </a:r>
+            <a:r>
+              <a:rPr lang="zh-CN" altLang="en-US" smtClean="0"/>
+              <a:t>微博采用了</a:t>
             </a:r>
             <a:r>
               <a:rPr lang="en-US" altLang="zh-CN" smtClean="0"/>
@@ -3948,24 +4622,43 @@
               <a:t>XML</a:t>
             </a:r>
             <a:r>
-              <a:rPr lang="zh-CN" altLang="en-US" smtClean="0"/>
-              <a:t>，网页中时常出现的那种</a:t>
-            </a:r>
-            <a:r>
               <a:rPr lang="en-US" altLang="zh-CN" smtClean="0"/>
-              <a:t>’</a:t>
-            </a:r>
-            <a:r>
-              <a:rPr lang="zh-CN" altLang="en-US" smtClean="0"/>
-              <a:t>查看更多</a:t>
+              <a:t>)</a:t>
+            </a:r>
+            <a:r>
+              <a:rPr lang="zh-CN" altLang="en-US" smtClean="0"/>
+              <a:t>加载网页</a:t>
             </a:r>
             <a:r>
               <a:rPr lang="en-US" altLang="zh-CN" smtClean="0"/>
-              <a:t>’</a:t>
-            </a:r>
-            <a:r>
-              <a:rPr lang="zh-CN" altLang="en-US" smtClean="0"/>
-              <a:t>源于此</a:t>
+              <a:t>,</a:t>
+            </a:r>
+            <a:r>
+              <a:rPr lang="zh-CN" altLang="en-US" smtClean="0"/>
+              <a:t>所以用</a:t>
+            </a:r>
+            <a:r>
+              <a:rPr lang="en-US" altLang="zh-CN" smtClean="0"/>
+              <a:t>requests</a:t>
+            </a:r>
+            <a:r>
+              <a:rPr lang="zh-CN" altLang="en-US" smtClean="0"/>
+              <a:t>所返回的网页源代码不是实时的，所以必须使用</a:t>
+            </a:r>
+            <a:r>
+              <a:rPr lang="en-US" altLang="zh-CN" smtClean="0"/>
+              <a:t>selenium</a:t>
+            </a:r>
+            <a:r>
+              <a:rPr lang="zh-CN" altLang="en-US" smtClean="0"/>
+              <a:t>模块模拟浏览器操作来实时加载网页并且获取网页源代码</a:t>
+            </a:r>
+            <a:endParaRPr lang="en-US" altLang="zh-CN"/>
+          </a:p>
+          <a:p>
+            <a:r>
+              <a:rPr lang="zh-CN" altLang="en-US" smtClean="0"/>
+              <a:t>由于微博的限制，只能在登录之后才可进行相关操作，自动化登录目前是一个问题，同时还有的就是如何自动输入验证码</a:t>
             </a:r>
             <a:endParaRPr lang="en-US" altLang="zh-CN" smtClean="0"/>
           </a:p>
@@ -4011,14 +4704,23 @@
             <p:ph type="title"/>
           </p:nvPr>
         </p:nvSpPr>
-        <p:spPr/>
+        <p:spPr>
+          <a:xfrm>
+            <a:off x="955341" y="409433"/>
+            <a:ext cx="9374875" cy="912766"/>
+          </a:xfrm>
+        </p:spPr>
         <p:txBody>
           <a:bodyPr/>
           <a:lstStyle/>
           <a:p>
             <a:r>
               <a:rPr lang="zh-CN" altLang="en-US" smtClean="0"/>
-              <a:t>需要使用那些</a:t>
+              <a:t>需要</a:t>
+            </a:r>
+            <a:r>
+              <a:rPr lang="zh-CN" altLang="en-US" smtClean="0"/>
+              <a:t>使用哪些</a:t>
             </a:r>
             <a:r>
               <a:rPr lang="en-US" altLang="zh-CN" smtClean="0"/>
@@ -4099,8 +4801,20 @@
               <a:t>requests.get()</a:t>
             </a:r>
             <a:r>
-              <a:rPr lang="zh-CN" altLang="en-US" smtClean="0"/>
-              <a:t>函数来获取网页源代码或者是上传验证信息</a:t>
+              <a:rPr lang="zh-CN" altLang="en-US"/>
+              <a:t>函数来上传</a:t>
+            </a:r>
+            <a:r>
+              <a:rPr lang="zh-CN" altLang="en-US"/>
+              <a:t>验证</a:t>
+            </a:r>
+            <a:r>
+              <a:rPr lang="zh-CN" altLang="en-US" smtClean="0"/>
+              <a:t>信息，</a:t>
+            </a:r>
+            <a:r>
+              <a:rPr lang="zh-CN" altLang="en-US" smtClean="0"/>
+              <a:t>获取网页源代码</a:t>
             </a:r>
             <a:endParaRPr lang="en-US" altLang="zh-CN" smtClean="0"/>
           </a:p>
@@ -4121,8 +4835,12 @@
           </a:p>
           <a:p>
             <a:r>
+              <a:rPr lang="zh-CN" altLang="en-US" smtClean="0"/>
+              <a:t>由于</a:t>
+            </a:r>
+            <a:r>
               <a:rPr lang="zh-CN" altLang="en-US"/>
-              <a:t>由于微博是使用</a:t>
+              <a:t>微博是使用</a:t>
             </a:r>
             <a:r>
               <a:rPr lang="en-US" altLang="zh-CN"/>
@@ -4130,7 +4848,11 @@
             </a:r>
             <a:r>
               <a:rPr lang="zh-CN" altLang="en-US"/>
-              <a:t>动态网页，所以只能用</a:t>
+              <a:t>动态网页</a:t>
+            </a:r>
+            <a:r>
+              <a:rPr lang="zh-CN" altLang="en-US" smtClean="0"/>
+              <a:t>，用</a:t>
             </a:r>
             <a:r>
               <a:rPr lang="en-US" altLang="zh-CN"/>
@@ -4142,7 +4864,7 @@
             </a:r>
             <a:r>
               <a:rPr lang="zh-CN" altLang="en-US" smtClean="0"/>
-              <a:t>获取</a:t>
+              <a:t>获取实时源码</a:t>
             </a:r>
             <a:endParaRPr lang="en-US" altLang="zh-CN" smtClean="0"/>
           </a:p>
@@ -4218,7 +4940,12 @@
             <p:ph type="title"/>
           </p:nvPr>
         </p:nvSpPr>
-        <p:spPr/>
+        <p:spPr>
+          <a:xfrm>
+            <a:off x="996285" y="395786"/>
+            <a:ext cx="9265693" cy="926413"/>
+          </a:xfrm>
+        </p:spPr>
         <p:txBody>
           <a:bodyPr/>
           <a:lstStyle/>
@@ -4257,7 +4984,7 @@
             </a:r>
             <a:r>
               <a:rPr lang="en-US" altLang="zh-CN" smtClean="0"/>
-              <a:t>python</a:t>
+              <a:t>Python</a:t>
             </a:r>
             <a:r>
               <a:rPr lang="zh-CN" altLang="en-US" smtClean="0"/>
@@ -4269,12 +4996,76 @@
             </a:r>
             <a:r>
               <a:rPr lang="zh-CN" altLang="en-US" smtClean="0"/>
-              <a:t>来完全模拟浏览器的操作</a:t>
-            </a:r>
-            <a:endParaRPr lang="zh-CN" altLang="en-US"/>
-          </a:p>
-        </p:txBody>
-      </p:sp>
+              <a:t>来完全模拟浏览器的</a:t>
+            </a:r>
+            <a:r>
+              <a:rPr lang="zh-CN" altLang="en-US" smtClean="0"/>
+              <a:t>操作</a:t>
+            </a:r>
+            <a:endParaRPr lang="en-US" altLang="zh-CN" smtClean="0"/>
+          </a:p>
+          <a:p>
+            <a:pPr marL="0" indent="0">
+              <a:buNone/>
+            </a:pPr>
+            <a:r>
+              <a:rPr lang="en-US" altLang="zh-CN" smtClean="0"/>
+              <a:t>Selenium</a:t>
+            </a:r>
+            <a:r>
+              <a:rPr lang="zh-CN" altLang="en-US" smtClean="0"/>
+              <a:t>模块可以支持</a:t>
+            </a:r>
+            <a:r>
+              <a:rPr lang="en-US" altLang="zh-CN" smtClean="0"/>
+              <a:t>Firefox,chrome…</a:t>
+            </a:r>
+            <a:endParaRPr lang="en-US" altLang="zh-CN" smtClean="0"/>
+          </a:p>
+          <a:p>
+            <a:pPr marL="0" indent="0">
+              <a:buNone/>
+            </a:pPr>
+            <a:endParaRPr lang="en-US" altLang="zh-CN" smtClean="0"/>
+          </a:p>
+          <a:p>
+            <a:pPr marL="0" indent="0">
+              <a:buNone/>
+            </a:pPr>
+            <a:endParaRPr lang="zh-CN" altLang="en-US"/>
+          </a:p>
+        </p:txBody>
+      </p:sp>
+    </p:spTree>
+    <p:extLst>
+      <p:ext uri="{BB962C8B-B14F-4D97-AF65-F5344CB8AC3E}">
+        <p14:creationId xmlns:p14="http://schemas.microsoft.com/office/powerpoint/2010/main" val="457152136"/>
+      </p:ext>
+    </p:extLst>
+  </p:cSld>
+  <p:clrMapOvr>
+    <a:masterClrMapping/>
+  </p:clrMapOvr>
+</p:sld>
+</file>
+
+<file path=ppt/slides/slide6.xml><?xml version="1.0" encoding="utf-8"?>
+<p:sld xmlns:a="http://schemas.openxmlformats.org/drawingml/2006/main" xmlns:r="http://schemas.openxmlformats.org/officeDocument/2006/relationships" xmlns:p="http://schemas.openxmlformats.org/presentationml/2006/main">
+  <p:cSld>
+    <p:spTree>
+      <p:nvGrpSpPr>
+        <p:cNvPr id="1" name=""/>
+        <p:cNvGrpSpPr/>
+        <p:nvPr/>
+      </p:nvGrpSpPr>
+      <p:grpSpPr>
+        <a:xfrm>
+          <a:off x="0" y="0"/>
+          <a:ext cx="0" cy="0"/>
+          <a:chOff x="0" y="0"/>
+          <a:chExt cx="0" cy="0"/>
+        </a:xfrm>
+      </p:grpSpPr>
       <p:sp>
         <p:nvSpPr>
           <p:cNvPr id="4" name="标题 1"/>
@@ -4285,8 +5076,8 @@
         </p:nvSpPr>
         <p:spPr>
           <a:xfrm>
-            <a:off x="838200" y="3531182"/>
-            <a:ext cx="10515600" cy="1325563"/>
+            <a:off x="914398" y="382137"/>
+            <a:ext cx="9606887" cy="1009356"/>
           </a:xfrm>
           <a:prstGeom prst="rect">
             <a:avLst/>
@@ -4342,8 +5133,8 @@
         </p:nvSpPr>
         <p:spPr>
           <a:xfrm>
-            <a:off x="838200" y="4896165"/>
-            <a:ext cx="10515600" cy="1110758"/>
+            <a:off x="783609" y="1866361"/>
+            <a:ext cx="10515600" cy="4364317"/>
           </a:xfrm>
           <a:prstGeom prst="rect">
             <a:avLst/>
@@ -4560,8 +5351,62 @@
             </a:r>
             <a:r>
               <a:rPr lang="zh-CN" altLang="en-US" smtClean="0"/>
-              <a:t>中自带相应的工具</a:t>
-            </a:r>
+              <a:t>中自带相应的</a:t>
+            </a:r>
+            <a:r>
+              <a:rPr lang="zh-CN" altLang="en-US" smtClean="0"/>
+              <a:t>工具</a:t>
+            </a:r>
+            <a:endParaRPr lang="en-US" altLang="zh-CN" smtClean="0"/>
+          </a:p>
+          <a:p>
+            <a:r>
+              <a:rPr lang="zh-CN" altLang="en-US" smtClean="0"/>
+              <a:t>同时</a:t>
+            </a:r>
+            <a:r>
+              <a:rPr lang="en-US" altLang="zh-CN" smtClean="0"/>
+              <a:t>Python</a:t>
+            </a:r>
+            <a:r>
+              <a:rPr lang="zh-CN" altLang="en-US" smtClean="0"/>
+              <a:t>中可以使用</a:t>
+            </a:r>
+            <a:r>
+              <a:rPr lang="en-US" altLang="zh-CN" smtClean="0"/>
+              <a:t>PyInstaller</a:t>
+            </a:r>
+            <a:r>
+              <a:rPr lang="zh-CN" altLang="en-US" smtClean="0"/>
+              <a:t>模块来打包</a:t>
+            </a:r>
+            <a:r>
+              <a:rPr lang="en-US" altLang="zh-CN" smtClean="0"/>
+              <a:t>python</a:t>
+            </a:r>
+            <a:r>
+              <a:rPr lang="zh-CN" altLang="en-US" smtClean="0"/>
+              <a:t>脚本成为可执行文件，运行在那些没有安装</a:t>
+            </a:r>
+            <a:r>
+              <a:rPr lang="en-US" altLang="zh-CN" smtClean="0"/>
+              <a:t>Python</a:t>
+            </a:r>
+            <a:r>
+              <a:rPr lang="zh-CN" altLang="en-US" smtClean="0"/>
+              <a:t>解释器的电脑中，同样也可以运行在</a:t>
+            </a:r>
+            <a:r>
+              <a:rPr lang="en-US" altLang="zh-CN" smtClean="0"/>
+              <a:t>Linux</a:t>
+            </a:r>
+            <a:r>
+              <a:rPr lang="zh-CN" altLang="en-US" smtClean="0"/>
+              <a:t>中</a:t>
+            </a:r>
+            <a:endParaRPr lang="en-US" altLang="zh-CN" smtClean="0"/>
+          </a:p>
+          <a:p>
             <a:endParaRPr lang="zh-CN" altLang="en-US"/>
           </a:p>
         </p:txBody>
@@ -4569,17 +5414,24 @@
     </p:spTree>
     <p:extLst>
       <p:ext uri="{BB962C8B-B14F-4D97-AF65-F5344CB8AC3E}">
-        <p14:creationId xmlns:p14="http://schemas.microsoft.com/office/powerpoint/2010/main" val="457152136"/>
+        <p14:creationId xmlns:p14="http://schemas.microsoft.com/office/powerpoint/2010/main" val="896558990"/>
       </p:ext>
     </p:extLst>
   </p:cSld>
   <p:clrMapOvr>
     <a:masterClrMapping/>
   </p:clrMapOvr>
+  <p:timing>
+    <p:tnLst>
+      <p:par>
+        <p:cTn id="1" dur="indefinite" restart="never" nodeType="tmRoot"/>
+      </p:par>
+    </p:tnLst>
+  </p:timing>
 </p:sld>
 </file>
 
-<file path=ppt/slides/slide6.xml><?xml version="1.0" encoding="utf-8"?>
+<file path=ppt/slides/slide7.xml><?xml version="1.0" encoding="utf-8"?>
 <p:sld xmlns:a="http://schemas.openxmlformats.org/drawingml/2006/main" xmlns:r="http://schemas.openxmlformats.org/officeDocument/2006/relationships" xmlns:p="http://schemas.openxmlformats.org/presentationml/2006/main">
   <p:cSld>
     <p:spTree>
@@ -4608,8 +5460,8 @@
         </p:nvSpPr>
         <p:spPr>
           <a:xfrm>
-            <a:off x="490471" y="213462"/>
-            <a:ext cx="10515600" cy="1325563"/>
+            <a:off x="1010989" y="474818"/>
+            <a:ext cx="9628554" cy="766964"/>
           </a:xfrm>
         </p:spPr>
         <p:txBody>
@@ -4632,8 +5484,8 @@
         </p:nvSpPr>
         <p:spPr>
           <a:xfrm>
-            <a:off x="1365158" y="1539025"/>
-            <a:ext cx="1596980" cy="811369"/>
+            <a:off x="1774980" y="1431249"/>
+            <a:ext cx="1557656" cy="340951"/>
           </a:xfrm>
           <a:prstGeom prst="flowChartAlternateProcess">
             <a:avLst/>
@@ -4698,8 +5550,8 @@
         </p:nvSpPr>
         <p:spPr>
           <a:xfrm>
-            <a:off x="1010989" y="2691203"/>
-            <a:ext cx="2305317" cy="837127"/>
+            <a:off x="604160" y="2280206"/>
+            <a:ext cx="2720414" cy="433144"/>
           </a:xfrm>
           <a:prstGeom prst="flowChartProcess">
             <a:avLst/>
@@ -4738,7 +5590,7 @@
                   </a:outerShdw>
                 </a:effectLst>
               </a:rPr>
-              <a:t>Requests</a:t>
+              <a:t>Selenium</a:t>
             </a:r>
             <a:r>
               <a:rPr lang="zh-CN" altLang="en-US" smtClean="0">
@@ -4754,7 +5606,7 @@
                   </a:outerShdw>
                 </a:effectLst>
               </a:rPr>
-              <a:t>爬取网页</a:t>
+              <a:t>模块打开浏览器</a:t>
             </a:r>
             <a:endParaRPr lang="zh-CN" altLang="en-US">
               <a:ln w="0"/>
@@ -4780,8 +5632,8 @@
         </p:nvSpPr>
         <p:spPr>
           <a:xfrm>
-            <a:off x="1010989" y="4117539"/>
-            <a:ext cx="2305317" cy="837127"/>
+            <a:off x="342900" y="3203242"/>
+            <a:ext cx="2989736" cy="369494"/>
           </a:xfrm>
           <a:prstGeom prst="flowChartProcess">
             <a:avLst/>
@@ -4820,7 +5672,7 @@
                   </a:outerShdw>
                 </a:effectLst>
               </a:rPr>
-              <a:t>BeautifulSoup</a:t>
+              <a:t>Selenium</a:t>
             </a:r>
             <a:r>
               <a:rPr lang="zh-CN" altLang="en-US" smtClean="0">
@@ -4836,7 +5688,7 @@
                   </a:outerShdw>
                 </a:effectLst>
               </a:rPr>
-              <a:t>解析网页源代码</a:t>
+              <a:t>模块控制微博登录</a:t>
             </a:r>
             <a:endParaRPr lang="zh-CN" altLang="en-US">
               <a:ln w="0"/>
@@ -4862,8 +5714,8 @@
         </p:nvSpPr>
         <p:spPr>
           <a:xfrm>
-            <a:off x="1188069" y="5421526"/>
-            <a:ext cx="1951149" cy="740534"/>
+            <a:off x="342900" y="3959208"/>
+            <a:ext cx="2950391" cy="433178"/>
           </a:xfrm>
           <a:prstGeom prst="flowChartProcess">
             <a:avLst/>
@@ -4902,7 +5754,7 @@
                   </a:outerShdw>
                 </a:effectLst>
               </a:rPr>
-              <a:t>Requests</a:t>
+              <a:t>Selenium</a:t>
             </a:r>
             <a:r>
               <a:rPr lang="zh-CN" altLang="en-US" smtClean="0">
@@ -4918,7 +5770,7 @@
                   </a:outerShdw>
                 </a:effectLst>
               </a:rPr>
-              <a:t>下载网页</a:t>
+              <a:t>模块获取实时源码</a:t>
             </a:r>
             <a:endParaRPr lang="zh-CN" altLang="en-US">
               <a:ln w="0"/>
@@ -4944,7 +5796,7 @@
         </p:nvSpPr>
         <p:spPr>
           <a:xfrm>
-            <a:off x="2021979" y="2240442"/>
+            <a:off x="3041237" y="1811351"/>
             <a:ext cx="283336" cy="450761"/>
           </a:xfrm>
           <a:prstGeom prst="downArrow">
@@ -4984,8 +5836,8 @@
         </p:nvSpPr>
         <p:spPr>
           <a:xfrm>
-            <a:off x="2021979" y="3550869"/>
-            <a:ext cx="283333" cy="534473"/>
+            <a:off x="3041237" y="2763446"/>
+            <a:ext cx="291399" cy="400645"/>
           </a:xfrm>
           <a:prstGeom prst="downArrow">
             <a:avLst/>
@@ -5024,8 +5876,8 @@
         </p:nvSpPr>
         <p:spPr>
           <a:xfrm>
-            <a:off x="2021975" y="4874173"/>
-            <a:ext cx="283336" cy="547353"/>
+            <a:off x="3041237" y="3611952"/>
+            <a:ext cx="275069" cy="347256"/>
           </a:xfrm>
           <a:prstGeom prst="downArrow">
             <a:avLst/>
@@ -5059,13 +5911,15 @@
       <p:cxnSp>
         <p:nvCxnSpPr>
           <p:cNvPr id="12" name="直接箭头连接符 11"/>
-          <p:cNvCxnSpPr/>
+          <p:cNvCxnSpPr>
+            <a:stCxn id="16" idx="1"/>
+          </p:cNvCxnSpPr>
           <p:nvPr/>
         </p:nvCxnSpPr>
         <p:spPr>
           <a:xfrm flipH="1">
-            <a:off x="3319524" y="3115482"/>
-            <a:ext cx="2995417" cy="0"/>
+            <a:off x="3332637" y="1647584"/>
+            <a:ext cx="817567" cy="880070"/>
           </a:xfrm>
           <a:prstGeom prst="straightConnector1">
             <a:avLst/>
@@ -5092,13 +5946,15 @@
       <p:cxnSp>
         <p:nvCxnSpPr>
           <p:cNvPr id="15" name="直接箭头连接符 14"/>
-          <p:cNvCxnSpPr/>
+          <p:cNvCxnSpPr>
+            <a:stCxn id="23" idx="1"/>
+          </p:cNvCxnSpPr>
           <p:nvPr/>
         </p:nvCxnSpPr>
         <p:spPr>
           <a:xfrm flipH="1">
-            <a:off x="3316306" y="4536102"/>
-            <a:ext cx="1906080" cy="0"/>
+            <a:off x="3332636" y="2625438"/>
+            <a:ext cx="817568" cy="767664"/>
           </a:xfrm>
           <a:prstGeom prst="straightConnector1">
             <a:avLst/>
@@ -5130,8 +5986,8 @@
         </p:nvSpPr>
         <p:spPr>
           <a:xfrm>
-            <a:off x="4150204" y="1365160"/>
-            <a:ext cx="7512688" cy="2465581"/>
+            <a:off x="4150204" y="1271357"/>
+            <a:ext cx="7512688" cy="752454"/>
           </a:xfrm>
           <a:prstGeom prst="flowChartPredefinedProcess">
             <a:avLst/>
@@ -5158,16 +6014,33 @@
           <a:lstStyle/>
           <a:p>
             <a:pPr marL="342900" indent="-342900">
-              <a:buFont typeface="+mj-lt"/>
               <a:buAutoNum type="arabicPeriod"/>
             </a:pPr>
+            <a:r>
+              <a:rPr lang="en-US" altLang="zh-CN" smtClean="0">
+                <a:solidFill>
+                  <a:schemeClr val="tx1"/>
+                </a:solidFill>
+              </a:rPr>
+              <a:t>Drive = webdrive.Firefox(executable_path = ‘’)</a:t>
+            </a:r>
+          </a:p>
+          <a:p>
+            <a:r>
+              <a:rPr lang="en-US" altLang="zh-CN" smtClean="0">
+                <a:solidFill>
+                  <a:schemeClr val="tx1"/>
+                </a:solidFill>
+              </a:rPr>
+              <a:t>#</a:t>
+            </a:r>
             <a:r>
               <a:rPr lang="zh-CN" altLang="en-US" smtClean="0">
                 <a:solidFill>
                   <a:schemeClr val="tx1"/>
                 </a:solidFill>
               </a:rPr>
-              <a:t>首先在</a:t>
+              <a:t>注意</a:t>
             </a:r>
             <a:r>
               <a:rPr lang="en-US" altLang="zh-CN" smtClean="0">
@@ -5175,7 +6048,7 @@
                   <a:schemeClr val="tx1"/>
                 </a:solidFill>
               </a:rPr>
-              <a:t>chrome</a:t>
+              <a:t>webdrive.Firefox</a:t>
             </a:r>
             <a:r>
               <a:rPr lang="zh-CN" altLang="en-US" smtClean="0">
@@ -5183,7 +6056,7 @@
                   <a:schemeClr val="tx1"/>
                 </a:solidFill>
               </a:rPr>
-              <a:t>浏览器界面微博登录界面按下</a:t>
+              <a:t>中的</a:t>
             </a:r>
             <a:r>
               <a:rPr lang="en-US" altLang="zh-CN" smtClean="0">
@@ -5191,7 +6064,7 @@
                   <a:schemeClr val="tx1"/>
                 </a:solidFill>
               </a:rPr>
-              <a:t>F12,</a:t>
+              <a:t>F</a:t>
             </a:r>
             <a:r>
               <a:rPr lang="zh-CN" altLang="en-US" smtClean="0">
@@ -5199,141 +6072,9 @@
                   <a:schemeClr val="tx1"/>
                 </a:solidFill>
               </a:rPr>
-              <a:t>进入开发者模式，然后选择</a:t>
-            </a:r>
-            <a:r>
-              <a:rPr lang="en-US" altLang="zh-CN" smtClean="0">
-                <a:solidFill>
-                  <a:schemeClr val="tx1"/>
-                </a:solidFill>
-              </a:rPr>
-              <a:t>Network,</a:t>
-            </a:r>
-            <a:r>
-              <a:rPr lang="zh-CN" altLang="en-US" smtClean="0">
-                <a:solidFill>
-                  <a:schemeClr val="tx1"/>
-                </a:solidFill>
-              </a:rPr>
-              <a:t>勾选</a:t>
-            </a:r>
-            <a:r>
-              <a:rPr lang="en-US" altLang="zh-CN" smtClean="0">
-                <a:solidFill>
-                  <a:schemeClr val="tx1"/>
-                </a:solidFill>
-              </a:rPr>
-              <a:t>Preserve log,</a:t>
-            </a:r>
-            <a:r>
-              <a:rPr lang="zh-CN" altLang="en-US" smtClean="0">
-                <a:solidFill>
-                  <a:schemeClr val="tx1"/>
-                </a:solidFill>
-              </a:rPr>
-              <a:t>输入密码等待登录成功后</a:t>
-            </a:r>
-            <a:r>
-              <a:rPr lang="en-US" altLang="zh-CN" smtClean="0">
-                <a:solidFill>
-                  <a:schemeClr val="tx1"/>
-                </a:solidFill>
-              </a:rPr>
-              <a:t>,</a:t>
-            </a:r>
-            <a:r>
-              <a:rPr lang="zh-CN" altLang="en-US" smtClean="0">
-                <a:solidFill>
-                  <a:schemeClr val="tx1"/>
-                </a:solidFill>
-              </a:rPr>
-              <a:t>可以找到</a:t>
-            </a:r>
-            <a:r>
-              <a:rPr lang="en-US" altLang="zh-CN" smtClean="0">
-                <a:solidFill>
-                  <a:schemeClr val="tx1"/>
-                </a:solidFill>
-              </a:rPr>
-              <a:t>header</a:t>
-            </a:r>
-            <a:r>
-              <a:rPr lang="zh-CN" altLang="en-US" smtClean="0">
-                <a:solidFill>
-                  <a:schemeClr val="tx1"/>
-                </a:solidFill>
-              </a:rPr>
-              <a:t>和</a:t>
-            </a:r>
-            <a:r>
-              <a:rPr lang="en-US" altLang="zh-CN" smtClean="0">
-                <a:solidFill>
-                  <a:schemeClr val="tx1"/>
-                </a:solidFill>
-              </a:rPr>
-              <a:t>data</a:t>
-            </a:r>
-          </a:p>
-          <a:p>
-            <a:pPr marL="342900" indent="-342900">
-              <a:buFont typeface="+mj-lt"/>
-              <a:buAutoNum type="arabicPeriod"/>
-            </a:pPr>
-            <a:r>
-              <a:rPr lang="zh-CN" altLang="en-US" smtClean="0">
-                <a:solidFill>
-                  <a:schemeClr val="tx1"/>
-                </a:solidFill>
-              </a:rPr>
-              <a:t>使用</a:t>
-            </a:r>
-            <a:r>
-              <a:rPr lang="en-US" altLang="zh-CN" smtClean="0">
-                <a:solidFill>
-                  <a:schemeClr val="tx1"/>
-                </a:solidFill>
-              </a:rPr>
-              <a:t>html = requests.post(url,headers,data) </a:t>
-            </a:r>
-          </a:p>
-          <a:p>
-            <a:pPr marL="342900" indent="-342900">
-              <a:buFont typeface="+mj-lt"/>
-              <a:buAutoNum type="arabicPeriod"/>
-            </a:pPr>
-            <a:r>
-              <a:rPr lang="en-US" altLang="zh-CN" smtClean="0">
-                <a:solidFill>
-                  <a:schemeClr val="tx1"/>
-                </a:solidFill>
-              </a:rPr>
-              <a:t>Html</a:t>
-            </a:r>
-            <a:r>
-              <a:rPr lang="zh-CN" altLang="en-US" smtClean="0">
-                <a:solidFill>
-                  <a:schemeClr val="tx1"/>
-                </a:solidFill>
-              </a:rPr>
-              <a:t>中可以找到</a:t>
-            </a:r>
-            <a:r>
-              <a:rPr lang="en-US" altLang="zh-CN" smtClean="0">
-                <a:solidFill>
-                  <a:schemeClr val="tx1"/>
-                </a:solidFill>
-              </a:rPr>
-              <a:t>html.cookies</a:t>
-            </a:r>
-            <a:r>
-              <a:rPr lang="zh-CN" altLang="en-US" smtClean="0">
-                <a:solidFill>
-                  <a:schemeClr val="tx1"/>
-                </a:solidFill>
-              </a:rPr>
-              <a:t>用于之后的登录</a:t>
-            </a:r>
-            <a:endParaRPr lang="zh-CN" altLang="en-US">
+              <a:t>一定要大写，否则报错</a:t>
+            </a:r>
+            <a:endParaRPr lang="en-US" altLang="zh-CN" smtClean="0">
               <a:solidFill>
                 <a:schemeClr val="tx1"/>
               </a:solidFill>
@@ -5480,6 +6221,455 @@
           </a:p>
         </p:txBody>
       </p:sp>
+      <p:sp>
+        <p:nvSpPr>
+          <p:cNvPr id="14" name="流程图: 过程 13"/>
+          <p:cNvSpPr/>
+          <p:nvPr/>
+        </p:nvSpPr>
+        <p:spPr>
+          <a:xfrm>
+            <a:off x="319885" y="4739642"/>
+            <a:ext cx="2950391" cy="433178"/>
+          </a:xfrm>
+          <a:prstGeom prst="flowChartProcess">
+            <a:avLst/>
+          </a:prstGeom>
+        </p:spPr>
+        <p:style>
+          <a:lnRef idx="2">
+            <a:schemeClr val="accent6"/>
+          </a:lnRef>
+          <a:fillRef idx="1">
+            <a:schemeClr val="lt1"/>
+          </a:fillRef>
+          <a:effectRef idx="0">
+            <a:schemeClr val="accent6"/>
+          </a:effectRef>
+          <a:fontRef idx="minor">
+            <a:schemeClr val="dk1"/>
+          </a:fontRef>
+        </p:style>
+        <p:txBody>
+          <a:bodyPr rtlCol="0" anchor="ctr"/>
+          <a:lstStyle/>
+          <a:p>
+            <a:pPr algn="ctr"/>
+            <a:r>
+              <a:rPr lang="en-US" altLang="zh-CN" smtClean="0">
+                <a:ln w="0"/>
+                <a:solidFill>
+                  <a:schemeClr val="tx1"/>
+                </a:solidFill>
+                <a:effectLst>
+                  <a:outerShdw blurRad="38100" dist="19050" dir="2700000" algn="tl" rotWithShape="0">
+                    <a:schemeClr val="dk1">
+                      <a:alpha val="40000"/>
+                    </a:schemeClr>
+                  </a:outerShdw>
+                </a:effectLst>
+              </a:rPr>
+              <a:t>Selenium</a:t>
+            </a:r>
+            <a:r>
+              <a:rPr lang="zh-CN" altLang="en-US" smtClean="0">
+                <a:ln w="0"/>
+                <a:solidFill>
+                  <a:schemeClr val="tx1"/>
+                </a:solidFill>
+                <a:effectLst>
+                  <a:outerShdw blurRad="38100" dist="19050" dir="2700000" algn="tl" rotWithShape="0">
+                    <a:schemeClr val="dk1">
+                      <a:alpha val="40000"/>
+                    </a:schemeClr>
+                  </a:outerShdw>
+                </a:effectLst>
+              </a:rPr>
+              <a:t>模块</a:t>
+            </a:r>
+            <a:r>
+              <a:rPr lang="en-US" altLang="zh-CN" smtClean="0">
+                <a:ln w="0"/>
+                <a:solidFill>
+                  <a:schemeClr val="tx1"/>
+                </a:solidFill>
+                <a:effectLst>
+                  <a:outerShdw blurRad="38100" dist="19050" dir="2700000" algn="tl" rotWithShape="0">
+                    <a:schemeClr val="dk1">
+                      <a:alpha val="40000"/>
+                    </a:schemeClr>
+                  </a:outerShdw>
+                </a:effectLst>
+              </a:rPr>
+              <a:t>By</a:t>
+            </a:r>
+            <a:r>
+              <a:rPr lang="zh-CN" altLang="en-US" smtClean="0">
+                <a:ln w="0"/>
+                <a:solidFill>
+                  <a:schemeClr val="tx1"/>
+                </a:solidFill>
+                <a:effectLst>
+                  <a:outerShdw blurRad="38100" dist="19050" dir="2700000" algn="tl" rotWithShape="0">
+                    <a:schemeClr val="dk1">
+                      <a:alpha val="40000"/>
+                    </a:schemeClr>
+                  </a:outerShdw>
+                </a:effectLst>
+              </a:rPr>
+              <a:t>类寻找标记</a:t>
+            </a:r>
+            <a:endParaRPr lang="zh-CN" altLang="en-US">
+              <a:ln w="0"/>
+              <a:solidFill>
+                <a:schemeClr val="tx1"/>
+              </a:solidFill>
+              <a:effectLst>
+                <a:outerShdw blurRad="38100" dist="19050" dir="2700000" algn="tl" rotWithShape="0">
+                  <a:schemeClr val="dk1">
+                    <a:alpha val="40000"/>
+                  </a:schemeClr>
+                </a:outerShdw>
+              </a:effectLst>
+            </a:endParaRPr>
+          </a:p>
+        </p:txBody>
+      </p:sp>
+      <p:sp>
+        <p:nvSpPr>
+          <p:cNvPr id="18" name="下箭头 17"/>
+          <p:cNvSpPr/>
+          <p:nvPr/>
+        </p:nvSpPr>
+        <p:spPr>
+          <a:xfrm>
+            <a:off x="3018222" y="4392386"/>
+            <a:ext cx="275069" cy="347256"/>
+          </a:xfrm>
+          <a:prstGeom prst="downArrow">
+            <a:avLst/>
+          </a:prstGeom>
+        </p:spPr>
+        <p:style>
+          <a:lnRef idx="2">
+            <a:schemeClr val="dk1">
+              <a:shade val="50000"/>
+            </a:schemeClr>
+          </a:lnRef>
+          <a:fillRef idx="1">
+            <a:schemeClr val="dk1"/>
+          </a:fillRef>
+          <a:effectRef idx="0">
+            <a:schemeClr val="dk1"/>
+          </a:effectRef>
+          <a:fontRef idx="minor">
+            <a:schemeClr val="lt1"/>
+          </a:fontRef>
+        </p:style>
+        <p:txBody>
+          <a:bodyPr rtlCol="0" anchor="ctr"/>
+          <a:lstStyle/>
+          <a:p>
+            <a:pPr algn="ctr"/>
+            <a:endParaRPr lang="zh-CN" altLang="en-US"/>
+          </a:p>
+        </p:txBody>
+      </p:sp>
+      <p:sp>
+        <p:nvSpPr>
+          <p:cNvPr id="19" name="流程图: 过程 18"/>
+          <p:cNvSpPr/>
+          <p:nvPr/>
+        </p:nvSpPr>
+        <p:spPr>
+          <a:xfrm>
+            <a:off x="1191986" y="5559292"/>
+            <a:ext cx="2058189" cy="433178"/>
+          </a:xfrm>
+          <a:prstGeom prst="flowChartProcess">
+            <a:avLst/>
+          </a:prstGeom>
+        </p:spPr>
+        <p:style>
+          <a:lnRef idx="2">
+            <a:schemeClr val="accent6"/>
+          </a:lnRef>
+          <a:fillRef idx="1">
+            <a:schemeClr val="lt1"/>
+          </a:fillRef>
+          <a:effectRef idx="0">
+            <a:schemeClr val="accent6"/>
+          </a:effectRef>
+          <a:fontRef idx="minor">
+            <a:schemeClr val="dk1"/>
+          </a:fontRef>
+        </p:style>
+        <p:txBody>
+          <a:bodyPr rtlCol="0" anchor="ctr"/>
+          <a:lstStyle/>
+          <a:p>
+            <a:pPr algn="ctr"/>
+            <a:r>
+              <a:rPr lang="zh-CN" altLang="en-US" smtClean="0">
+                <a:ln w="0"/>
+                <a:solidFill>
+                  <a:schemeClr val="tx1"/>
+                </a:solidFill>
+                <a:effectLst>
+                  <a:outerShdw blurRad="38100" dist="19050" dir="2700000" algn="tl" rotWithShape="0">
+                    <a:schemeClr val="dk1">
+                      <a:alpha val="40000"/>
+                    </a:schemeClr>
+                  </a:outerShdw>
+                </a:effectLst>
+              </a:rPr>
+              <a:t>解析源码获取链接</a:t>
+            </a:r>
+            <a:endParaRPr lang="zh-CN" altLang="en-US">
+              <a:ln w="0"/>
+              <a:solidFill>
+                <a:schemeClr val="tx1"/>
+              </a:solidFill>
+              <a:effectLst>
+                <a:outerShdw blurRad="38100" dist="19050" dir="2700000" algn="tl" rotWithShape="0">
+                  <a:schemeClr val="dk1">
+                    <a:alpha val="40000"/>
+                  </a:schemeClr>
+                </a:outerShdw>
+              </a:effectLst>
+            </a:endParaRPr>
+          </a:p>
+        </p:txBody>
+      </p:sp>
+      <p:sp>
+        <p:nvSpPr>
+          <p:cNvPr id="20" name="下箭头 19"/>
+          <p:cNvSpPr/>
+          <p:nvPr/>
+        </p:nvSpPr>
+        <p:spPr>
+          <a:xfrm>
+            <a:off x="2998121" y="5212036"/>
+            <a:ext cx="275069" cy="347256"/>
+          </a:xfrm>
+          <a:prstGeom prst="downArrow">
+            <a:avLst/>
+          </a:prstGeom>
+        </p:spPr>
+        <p:style>
+          <a:lnRef idx="2">
+            <a:schemeClr val="dk1">
+              <a:shade val="50000"/>
+            </a:schemeClr>
+          </a:lnRef>
+          <a:fillRef idx="1">
+            <a:schemeClr val="dk1"/>
+          </a:fillRef>
+          <a:effectRef idx="0">
+            <a:schemeClr val="dk1"/>
+          </a:effectRef>
+          <a:fontRef idx="minor">
+            <a:schemeClr val="lt1"/>
+          </a:fontRef>
+        </p:style>
+        <p:txBody>
+          <a:bodyPr rtlCol="0" anchor="ctr"/>
+          <a:lstStyle/>
+          <a:p>
+            <a:pPr algn="ctr"/>
+            <a:endParaRPr lang="zh-CN" altLang="en-US"/>
+          </a:p>
+        </p:txBody>
+      </p:sp>
+      <p:sp>
+        <p:nvSpPr>
+          <p:cNvPr id="21" name="流程图: 过程 20"/>
+          <p:cNvSpPr/>
+          <p:nvPr/>
+        </p:nvSpPr>
+        <p:spPr>
+          <a:xfrm>
+            <a:off x="2514600" y="6355093"/>
+            <a:ext cx="712560" cy="433178"/>
+          </a:xfrm>
+          <a:prstGeom prst="flowChartProcess">
+            <a:avLst/>
+          </a:prstGeom>
+        </p:spPr>
+        <p:style>
+          <a:lnRef idx="2">
+            <a:schemeClr val="accent6"/>
+          </a:lnRef>
+          <a:fillRef idx="1">
+            <a:schemeClr val="lt1"/>
+          </a:fillRef>
+          <a:effectRef idx="0">
+            <a:schemeClr val="accent6"/>
+          </a:effectRef>
+          <a:fontRef idx="minor">
+            <a:schemeClr val="dk1"/>
+          </a:fontRef>
+        </p:style>
+        <p:txBody>
+          <a:bodyPr rtlCol="0" anchor="ctr"/>
+          <a:lstStyle/>
+          <a:p>
+            <a:pPr algn="ctr"/>
+            <a:r>
+              <a:rPr lang="zh-CN" altLang="en-US">
+                <a:ln w="0"/>
+                <a:solidFill>
+                  <a:schemeClr val="tx1"/>
+                </a:solidFill>
+                <a:effectLst>
+                  <a:outerShdw blurRad="38100" dist="19050" dir="2700000" algn="tl" rotWithShape="0">
+                    <a:schemeClr val="dk1">
+                      <a:alpha val="40000"/>
+                    </a:schemeClr>
+                  </a:outerShdw>
+                </a:effectLst>
+              </a:rPr>
+              <a:t>下载</a:t>
+            </a:r>
+            <a:endParaRPr lang="zh-CN" altLang="en-US">
+              <a:ln w="0"/>
+              <a:solidFill>
+                <a:schemeClr val="tx1"/>
+              </a:solidFill>
+              <a:effectLst>
+                <a:outerShdw blurRad="38100" dist="19050" dir="2700000" algn="tl" rotWithShape="0">
+                  <a:schemeClr val="dk1">
+                    <a:alpha val="40000"/>
+                  </a:schemeClr>
+                </a:outerShdw>
+              </a:effectLst>
+            </a:endParaRPr>
+          </a:p>
+        </p:txBody>
+      </p:sp>
+      <p:sp>
+        <p:nvSpPr>
+          <p:cNvPr id="22" name="下箭头 21"/>
+          <p:cNvSpPr/>
+          <p:nvPr/>
+        </p:nvSpPr>
+        <p:spPr>
+          <a:xfrm>
+            <a:off x="2975106" y="6007837"/>
+            <a:ext cx="275069" cy="347256"/>
+          </a:xfrm>
+          <a:prstGeom prst="downArrow">
+            <a:avLst/>
+          </a:prstGeom>
+        </p:spPr>
+        <p:style>
+          <a:lnRef idx="2">
+            <a:schemeClr val="dk1">
+              <a:shade val="50000"/>
+            </a:schemeClr>
+          </a:lnRef>
+          <a:fillRef idx="1">
+            <a:schemeClr val="dk1"/>
+          </a:fillRef>
+          <a:effectRef idx="0">
+            <a:schemeClr val="dk1"/>
+          </a:effectRef>
+          <a:fontRef idx="minor">
+            <a:schemeClr val="lt1"/>
+          </a:fontRef>
+        </p:style>
+        <p:txBody>
+          <a:bodyPr rtlCol="0" anchor="ctr"/>
+          <a:lstStyle/>
+          <a:p>
+            <a:pPr algn="ctr"/>
+            <a:endParaRPr lang="zh-CN" altLang="en-US"/>
+          </a:p>
+        </p:txBody>
+      </p:sp>
+      <p:sp>
+        <p:nvSpPr>
+          <p:cNvPr id="23" name="流程图: 预定义过程 22"/>
+          <p:cNvSpPr/>
+          <p:nvPr/>
+        </p:nvSpPr>
+        <p:spPr>
+          <a:xfrm>
+            <a:off x="4150204" y="2146327"/>
+            <a:ext cx="7512688" cy="958222"/>
+          </a:xfrm>
+          <a:prstGeom prst="flowChartPredefinedProcess">
+            <a:avLst/>
+          </a:prstGeom>
+        </p:spPr>
+        <p:style>
+          <a:lnRef idx="2">
+            <a:schemeClr val="accent4">
+              <a:shade val="50000"/>
+            </a:schemeClr>
+          </a:lnRef>
+          <a:fillRef idx="1">
+            <a:schemeClr val="accent4"/>
+          </a:fillRef>
+          <a:effectRef idx="0">
+            <a:schemeClr val="accent4"/>
+          </a:effectRef>
+          <a:fontRef idx="minor">
+            <a:schemeClr val="lt1"/>
+          </a:fontRef>
+        </p:style>
+        <p:txBody>
+          <a:bodyPr rtlCol="0" anchor="ctr"/>
+          <a:lstStyle/>
+          <a:p>
+            <a:pPr marL="342900" indent="-342900">
+              <a:buAutoNum type="arabicPeriod"/>
+            </a:pPr>
+            <a:r>
+              <a:rPr lang="en-US" altLang="zh-CN" smtClean="0">
+                <a:solidFill>
+                  <a:schemeClr val="tx1"/>
+                </a:solidFill>
+              </a:rPr>
+              <a:t>Login=wait.until(EC.element_to_be_clickable</a:t>
+            </a:r>
+            <a:r>
+              <a:rPr lang="en-US" altLang="zh-CN">
+                <a:solidFill>
+                  <a:schemeClr val="tx1"/>
+                </a:solidFill>
+              </a:rPr>
+              <a:t>((By.XPATH, '//li/a[@node-type="loginBtn"]')))</a:t>
+            </a:r>
+          </a:p>
+          <a:p>
+            <a:pPr marL="342900" indent="-342900">
+              <a:buAutoNum type="arabicPeriod"/>
+            </a:pPr>
+            <a:r>
+              <a:rPr lang="en-US" altLang="zh-CN" smtClean="0">
+                <a:solidFill>
+                  <a:schemeClr val="tx1"/>
+                </a:solidFill>
+              </a:rPr>
+              <a:t>Login.click</a:t>
+            </a:r>
+            <a:r>
+              <a:rPr lang="en-US" altLang="zh-CN">
+                <a:solidFill>
+                  <a:schemeClr val="tx1"/>
+                </a:solidFill>
+              </a:rPr>
+              <a:t>()</a:t>
+            </a:r>
+            <a:endParaRPr lang="en-US" altLang="zh-CN" smtClean="0">
+              <a:solidFill>
+                <a:schemeClr val="tx1"/>
+              </a:solidFill>
+            </a:endParaRPr>
+          </a:p>
+        </p:txBody>
+      </p:sp>
     </p:spTree>
     <p:extLst>
       <p:ext uri="{BB962C8B-B14F-4D97-AF65-F5344CB8AC3E}">
@@ -5500,7 +6690,7 @@
 </p:sld>
 </file>
 
-<file path=ppt/slides/slide7.xml><?xml version="1.0" encoding="utf-8"?>
+<file path=ppt/slides/slide8.xml><?xml version="1.0" encoding="utf-8"?>
 <p:sld xmlns:a="http://schemas.openxmlformats.org/drawingml/2006/main" xmlns:r="http://schemas.openxmlformats.org/officeDocument/2006/relationships" xmlns:p="http://schemas.openxmlformats.org/presentationml/2006/main">
   <p:cSld>
     <p:spTree>
@@ -5683,7 +6873,7 @@
         <p:spPr>
           <a:xfrm>
             <a:off x="334851" y="218942"/>
-            <a:ext cx="3005951" cy="769441"/>
+            <a:ext cx="3153427" cy="769441"/>
           </a:xfrm>
           <a:prstGeom prst="rect">
             <a:avLst/>
@@ -5697,8 +6887,12 @@
           <a:lstStyle/>
           <a:p>
             <a:r>
+              <a:rPr lang="en-US" altLang="zh-CN" sz="4400" smtClean="0"/>
+              <a:t>Part Code</a:t>
+            </a:r>
+            <a:r>
               <a:rPr lang="zh-CN" altLang="en-US" sz="4400" smtClean="0"/>
-              <a:t>示例代码：</a:t>
+              <a:t>：</a:t>
             </a:r>
             <a:endParaRPr lang="zh-CN" altLang="en-US" sz="4400"/>
           </a:p>
@@ -5872,180 +7066,6 @@
                 <a:extLst>
                   <a:ext uri="{0D108BD9-81ED-4DB2-BD59-A6C34878D82A}">
                     <a16:rowId xmlns:a16="http://schemas.microsoft.com/office/drawing/2014/main" val="1315157825"/>
-                  </a:ext>
-                </a:extLst>
-              </a:tr>
-            </a:tbl>
-          </a:graphicData>
-        </a:graphic>
-      </p:graphicFrame>
-      <p:graphicFrame>
-        <p:nvGraphicFramePr>
-          <p:cNvPr id="6" name="表格 5"/>
-          <p:cNvGraphicFramePr>
-            <a:graphicFrameLocks noGrp="1"/>
-          </p:cNvGraphicFramePr>
-          <p:nvPr>
-            <p:extLst>
-              <p:ext uri="{D42A27DB-BD31-4B8C-83A1-F6EECF244321}">
-                <p14:modId xmlns:p14="http://schemas.microsoft.com/office/powerpoint/2010/main" val="3466164703"/>
-              </p:ext>
-            </p:extLst>
-          </p:nvPr>
-        </p:nvGraphicFramePr>
-        <p:xfrm>
-          <a:off x="5653824" y="2411951"/>
-          <a:ext cx="6035183" cy="1463040"/>
-        </p:xfrm>
-        <a:graphic>
-          <a:graphicData uri="http://schemas.openxmlformats.org/drawingml/2006/table">
-            <a:tbl>
-              <a:tblPr firstRow="1" bandRow="1">
-                <a:tableStyleId>{5C22544A-7EE6-4342-B048-85BDC9FD1C3A}</a:tableStyleId>
-              </a:tblPr>
-              <a:tblGrid>
-                <a:gridCol w="6035183">
-                  <a:extLst>
-                    <a:ext uri="{9D8B030D-6E8A-4147-A177-3AD203B41FA5}">
-                      <a16:colId xmlns:a16="http://schemas.microsoft.com/office/drawing/2014/main" val="3988467799"/>
-                    </a:ext>
-                  </a:extLst>
-                </a:gridCol>
-              </a:tblGrid>
-              <a:tr h="1057619">
-                <a:tc>
-                  <a:txBody>
-                    <a:bodyPr/>
-                    <a:lstStyle/>
-                    <a:p>
-                      <a:r>
-                        <a:rPr lang="en-US" altLang="zh-CN" b="0" smtClean="0">
-                          <a:solidFill>
-                            <a:schemeClr val="tx1"/>
-                          </a:solidFill>
-                        </a:rPr>
-                        <a:t>#</a:t>
-                      </a:r>
-                      <a:r>
-                        <a:rPr lang="zh-CN" altLang="en-US" b="0" smtClean="0">
-                          <a:solidFill>
-                            <a:schemeClr val="tx1"/>
-                          </a:solidFill>
-                        </a:rPr>
-                        <a:t>简单的登录后获取</a:t>
-                      </a:r>
-                      <a:r>
-                        <a:rPr lang="en-US" altLang="zh-CN" b="0" smtClean="0">
-                          <a:solidFill>
-                            <a:schemeClr val="tx1"/>
-                          </a:solidFill>
-                        </a:rPr>
-                        <a:t>cookies</a:t>
-                      </a:r>
-                    </a:p>
-                    <a:p>
-                      <a:r>
-                        <a:rPr lang="en-US" altLang="zh-CN" b="0" smtClean="0">
-                          <a:solidFill>
-                            <a:schemeClr val="tx1"/>
-                          </a:solidFill>
-                        </a:rPr>
-                        <a:t>import requests</a:t>
-                      </a:r>
-                    </a:p>
-                    <a:p>
-                      <a:r>
-                        <a:rPr lang="en-US" altLang="zh-CN" b="0" smtClean="0">
-                          <a:solidFill>
-                            <a:schemeClr val="tx1"/>
-                          </a:solidFill>
-                        </a:rPr>
-                        <a:t>#headers={}</a:t>
-                      </a:r>
-                      <a:r>
-                        <a:rPr lang="zh-CN" altLang="en-US" b="0" smtClean="0">
-                          <a:solidFill>
-                            <a:schemeClr val="tx1"/>
-                          </a:solidFill>
-                        </a:rPr>
-                        <a:t>是一个字典</a:t>
-                      </a:r>
-                      <a:endParaRPr lang="en-US" altLang="zh-CN" b="0" smtClean="0">
-                        <a:solidFill>
-                          <a:schemeClr val="tx1"/>
-                        </a:solidFill>
-                      </a:endParaRPr>
-                    </a:p>
-                    <a:p>
-                      <a:r>
-                        <a:rPr lang="en-US" altLang="zh-CN" b="0" smtClean="0">
-                          <a:solidFill>
-                            <a:schemeClr val="tx1"/>
-                          </a:solidFill>
-                        </a:rPr>
-                        <a:t>Str1</a:t>
-                      </a:r>
-                      <a:r>
-                        <a:rPr lang="en-US" altLang="zh-CN" b="0" baseline="0" smtClean="0">
-                          <a:solidFill>
-                            <a:schemeClr val="tx1"/>
-                          </a:solidFill>
-                        </a:rPr>
-                        <a:t> = </a:t>
-                      </a:r>
-                      <a:r>
-                        <a:rPr lang="en-US" altLang="zh-CN" b="0" smtClean="0">
-                          <a:solidFill>
-                            <a:schemeClr val="tx1"/>
-                          </a:solidFill>
-                        </a:rPr>
-                        <a:t>Request.post(login_url,</a:t>
-                      </a:r>
-                      <a:r>
-                        <a:rPr lang="en-US" altLang="zh-CN" b="0" baseline="0" smtClean="0">
-                          <a:solidFill>
-                            <a:schemeClr val="tx1"/>
-                          </a:solidFill>
-                        </a:rPr>
-                        <a:t> headers={ } ,</a:t>
-                      </a:r>
-                      <a:r>
-                        <a:rPr lang="en-US" altLang="zh-CN" b="0" smtClean="0">
-                          <a:solidFill>
-                            <a:schemeClr val="tx1"/>
-                          </a:solidFill>
-                        </a:rPr>
-                        <a:t>data=‘’)</a:t>
-                      </a:r>
-                    </a:p>
-                    <a:p>
-                      <a:r>
-                        <a:rPr lang="en-US" altLang="zh-CN" b="0" smtClean="0">
-                          <a:solidFill>
-                            <a:schemeClr val="tx1"/>
-                          </a:solidFill>
-                        </a:rPr>
-                        <a:t>Str2 = Request.get(target_url,headers={ },cookies=‘’)</a:t>
-                      </a:r>
-                      <a:endParaRPr lang="zh-CN" altLang="en-US" b="0">
-                        <a:solidFill>
-                          <a:schemeClr val="tx1"/>
-                        </a:solidFill>
-                      </a:endParaRPr>
-                    </a:p>
-                  </a:txBody>
-                  <a:tcPr>
-                    <a:solidFill>
-                      <a:schemeClr val="accent2">
-                        <a:lumMod val="40000"/>
-                        <a:lumOff val="60000"/>
-                      </a:schemeClr>
-                    </a:solidFill>
-                  </a:tcPr>
-                </a:tc>
-                <a:extLst>
-                  <a:ext uri="{0D108BD9-81ED-4DB2-BD59-A6C34878D82A}">
-                    <a16:rowId xmlns:a16="http://schemas.microsoft.com/office/drawing/2014/main" val="1888392844"/>
                   </a:ext>
                 </a:extLst>
               </a:tr>
@@ -6372,6 +7392,245 @@
           </a:graphicData>
         </a:graphic>
       </p:graphicFrame>
+      <p:graphicFrame>
+        <p:nvGraphicFramePr>
+          <p:cNvPr id="10" name="表格 9"/>
+          <p:cNvGraphicFramePr>
+            <a:graphicFrameLocks noGrp="1"/>
+          </p:cNvGraphicFramePr>
+          <p:nvPr>
+            <p:extLst>
+              <p:ext uri="{D42A27DB-BD31-4B8C-83A1-F6EECF244321}">
+                <p14:modId xmlns:p14="http://schemas.microsoft.com/office/powerpoint/2010/main" val="918782506"/>
+              </p:ext>
+            </p:extLst>
+          </p:nvPr>
+        </p:nvGraphicFramePr>
+        <p:xfrm>
+          <a:off x="5653824" y="2411951"/>
+          <a:ext cx="6035183" cy="1463040"/>
+        </p:xfrm>
+        <a:graphic>
+          <a:graphicData uri="http://schemas.openxmlformats.org/drawingml/2006/table">
+            <a:tbl>
+              <a:tblPr firstRow="1" bandRow="1">
+                <a:tableStyleId>{5C22544A-7EE6-4342-B048-85BDC9FD1C3A}</a:tableStyleId>
+              </a:tblPr>
+              <a:tblGrid>
+                <a:gridCol w="6035183">
+                  <a:extLst>
+                    <a:ext uri="{9D8B030D-6E8A-4147-A177-3AD203B41FA5}">
+                      <a16:colId xmlns:a16="http://schemas.microsoft.com/office/drawing/2014/main" val="3988467799"/>
+                    </a:ext>
+                  </a:extLst>
+                </a:gridCol>
+              </a:tblGrid>
+              <a:tr h="1057619">
+                <a:tc>
+                  <a:txBody>
+                    <a:bodyPr/>
+                    <a:lstStyle/>
+                    <a:p>
+                      <a:r>
+                        <a:rPr lang="en-US" altLang="zh-CN" b="0" smtClean="0">
+                          <a:solidFill>
+                            <a:schemeClr val="tx1"/>
+                          </a:solidFill>
+                        </a:rPr>
+                        <a:t>#</a:t>
+                      </a:r>
+                      <a:r>
+                        <a:rPr lang="zh-CN" altLang="en-US" b="0" smtClean="0">
+                          <a:solidFill>
+                            <a:schemeClr val="tx1"/>
+                          </a:solidFill>
+                        </a:rPr>
+                        <a:t>简单的登录后获取</a:t>
+                      </a:r>
+                      <a:r>
+                        <a:rPr lang="en-US" altLang="zh-CN" b="0" smtClean="0">
+                          <a:solidFill>
+                            <a:schemeClr val="tx1"/>
+                          </a:solidFill>
+                        </a:rPr>
+                        <a:t>cookies</a:t>
+                      </a:r>
+                    </a:p>
+                    <a:p>
+                      <a:r>
+                        <a:rPr lang="en-US" altLang="zh-CN" b="0" smtClean="0">
+                          <a:solidFill>
+                            <a:schemeClr val="tx1"/>
+                          </a:solidFill>
+                        </a:rPr>
+                        <a:t>import requests</a:t>
+                      </a:r>
+                    </a:p>
+                    <a:p>
+                      <a:r>
+                        <a:rPr lang="en-US" altLang="zh-CN" b="0" smtClean="0">
+                          <a:solidFill>
+                            <a:schemeClr val="tx1"/>
+                          </a:solidFill>
+                        </a:rPr>
+                        <a:t>#headers={}</a:t>
+                      </a:r>
+                      <a:r>
+                        <a:rPr lang="zh-CN" altLang="en-US" b="0" smtClean="0">
+                          <a:solidFill>
+                            <a:schemeClr val="tx1"/>
+                          </a:solidFill>
+                        </a:rPr>
+                        <a:t>是一个字典</a:t>
+                      </a:r>
+                      <a:endParaRPr lang="en-US" altLang="zh-CN" b="0" smtClean="0">
+                        <a:solidFill>
+                          <a:schemeClr val="tx1"/>
+                        </a:solidFill>
+                      </a:endParaRPr>
+                    </a:p>
+                    <a:p>
+                      <a:r>
+                        <a:rPr lang="en-US" altLang="zh-CN" b="0" smtClean="0">
+                          <a:solidFill>
+                            <a:schemeClr val="tx1"/>
+                          </a:solidFill>
+                        </a:rPr>
+                        <a:t>Str1</a:t>
+                      </a:r>
+                      <a:r>
+                        <a:rPr lang="en-US" altLang="zh-CN" b="0" baseline="0" smtClean="0">
+                          <a:solidFill>
+                            <a:schemeClr val="tx1"/>
+                          </a:solidFill>
+                        </a:rPr>
+                        <a:t> = </a:t>
+                      </a:r>
+                      <a:r>
+                        <a:rPr lang="en-US" altLang="zh-CN" b="0" smtClean="0">
+                          <a:solidFill>
+                            <a:schemeClr val="tx1"/>
+                          </a:solidFill>
+                        </a:rPr>
+                        <a:t>Request.post(login_url,</a:t>
+                      </a:r>
+                      <a:r>
+                        <a:rPr lang="en-US" altLang="zh-CN" b="0" baseline="0" smtClean="0">
+                          <a:solidFill>
+                            <a:schemeClr val="tx1"/>
+                          </a:solidFill>
+                        </a:rPr>
+                        <a:t> headers={ } ,</a:t>
+                      </a:r>
+                      <a:r>
+                        <a:rPr lang="en-US" altLang="zh-CN" b="0" smtClean="0">
+                          <a:solidFill>
+                            <a:schemeClr val="tx1"/>
+                          </a:solidFill>
+                        </a:rPr>
+                        <a:t>data=‘’)</a:t>
+                      </a:r>
+                    </a:p>
+                    <a:p>
+                      <a:r>
+                        <a:rPr lang="en-US" altLang="zh-CN" b="0" smtClean="0">
+                          <a:solidFill>
+                            <a:schemeClr val="tx1"/>
+                          </a:solidFill>
+                        </a:rPr>
+                        <a:t>Str2 = Request.get(target_url,headers={ },cookies=‘’)</a:t>
+                      </a:r>
+                      <a:endParaRPr lang="zh-CN" altLang="en-US" b="0">
+                        <a:solidFill>
+                          <a:schemeClr val="tx1"/>
+                        </a:solidFill>
+                      </a:endParaRPr>
+                    </a:p>
+                  </a:txBody>
+                  <a:tcPr>
+                    <a:solidFill>
+                      <a:schemeClr val="accent2">
+                        <a:lumMod val="40000"/>
+                        <a:lumOff val="60000"/>
+                      </a:schemeClr>
+                    </a:solidFill>
+                  </a:tcPr>
+                </a:tc>
+                <a:extLst>
+                  <a:ext uri="{0D108BD9-81ED-4DB2-BD59-A6C34878D82A}">
+                    <a16:rowId xmlns:a16="http://schemas.microsoft.com/office/drawing/2014/main" val="1888392844"/>
+                  </a:ext>
+                </a:extLst>
+              </a:tr>
+            </a:tbl>
+          </a:graphicData>
+        </a:graphic>
+      </p:graphicFrame>
+      <p:graphicFrame>
+        <p:nvGraphicFramePr>
+          <p:cNvPr id="11" name="表格 10"/>
+          <p:cNvGraphicFramePr>
+            <a:graphicFrameLocks noGrp="1"/>
+          </p:cNvGraphicFramePr>
+          <p:nvPr>
+            <p:extLst>
+              <p:ext uri="{D42A27DB-BD31-4B8C-83A1-F6EECF244321}">
+                <p14:modId xmlns:p14="http://schemas.microsoft.com/office/powerpoint/2010/main" val="538570505"/>
+              </p:ext>
+            </p:extLst>
+          </p:nvPr>
+        </p:nvGraphicFramePr>
+        <p:xfrm>
+          <a:off x="5653824" y="3983413"/>
+          <a:ext cx="6035183" cy="834247"/>
+        </p:xfrm>
+        <a:graphic>
+          <a:graphicData uri="http://schemas.openxmlformats.org/drawingml/2006/table">
+            <a:tbl>
+              <a:tblPr firstRow="1" bandRow="1">
+                <a:tableStyleId>{5C22544A-7EE6-4342-B048-85BDC9FD1C3A}</a:tableStyleId>
+              </a:tblPr>
+              <a:tblGrid>
+                <a:gridCol w="6035183">
+                  <a:extLst>
+                    <a:ext uri="{9D8B030D-6E8A-4147-A177-3AD203B41FA5}">
+                      <a16:colId xmlns:a16="http://schemas.microsoft.com/office/drawing/2014/main" val="3988467799"/>
+                    </a:ext>
+                  </a:extLst>
+                </a:gridCol>
+              </a:tblGrid>
+              <a:tr h="834247">
+                <a:tc>
+                  <a:txBody>
+                    <a:bodyPr/>
+                    <a:lstStyle/>
+                    <a:p>
+                      <a:endParaRPr lang="zh-CN" altLang="en-US" b="0">
+                        <a:solidFill>
+                          <a:schemeClr val="tx1"/>
+                        </a:solidFill>
+                      </a:endParaRPr>
+                    </a:p>
+                  </a:txBody>
+                  <a:tcPr>
+                    <a:solidFill>
+                      <a:schemeClr val="accent2">
+                        <a:lumMod val="40000"/>
+                        <a:lumOff val="60000"/>
+                      </a:schemeClr>
+                    </a:solidFill>
+                  </a:tcPr>
+                </a:tc>
+                <a:extLst>
+                  <a:ext uri="{0D108BD9-81ED-4DB2-BD59-A6C34878D82A}">
+                    <a16:rowId xmlns:a16="http://schemas.microsoft.com/office/drawing/2014/main" val="1888392844"/>
+                  </a:ext>
+                </a:extLst>
+              </a:tr>
+            </a:tbl>
+          </a:graphicData>
+        </a:graphic>
+      </p:graphicFrame>
     </p:spTree>
     <p:extLst>
       <p:ext uri="{BB962C8B-B14F-4D97-AF65-F5344CB8AC3E}">
@@ -6389,6 +7648,87 @@
       </p:par>
     </p:tnLst>
   </p:timing>
+</p:sld>
+</file>
+
+<file path=ppt/slides/slide9.xml><?xml version="1.0" encoding="utf-8"?>
+<p:sld xmlns:a="http://schemas.openxmlformats.org/drawingml/2006/main" xmlns:r="http://schemas.openxmlformats.org/officeDocument/2006/relationships" xmlns:p="http://schemas.openxmlformats.org/presentationml/2006/main">
+  <p:cSld>
+    <p:spTree>
+      <p:nvGrpSpPr>
+        <p:cNvPr id="1" name=""/>
+        <p:cNvGrpSpPr/>
+        <p:nvPr/>
+      </p:nvGrpSpPr>
+      <p:grpSpPr>
+        <a:xfrm>
+          <a:off x="0" y="0"/>
+          <a:ext cx="0" cy="0"/>
+          <a:chOff x="0" y="0"/>
+          <a:chExt cx="0" cy="0"/>
+        </a:xfrm>
+      </p:grpSpPr>
+      <p:sp>
+        <p:nvSpPr>
+          <p:cNvPr id="2" name="标题 1"/>
+          <p:cNvSpPr>
+            <a:spLocks noGrp="1"/>
+          </p:cNvSpPr>
+          <p:nvPr>
+            <p:ph type="title"/>
+          </p:nvPr>
+        </p:nvSpPr>
+        <p:spPr/>
+        <p:txBody>
+          <a:bodyPr/>
+          <a:lstStyle/>
+          <a:p>
+            <a:r>
+              <a:rPr lang="en-US" altLang="zh-CN" smtClean="0"/>
+              <a:t>ISSUE</a:t>
+            </a:r>
+            <a:endParaRPr lang="zh-CN" altLang="en-US"/>
+          </a:p>
+        </p:txBody>
+      </p:sp>
+      <p:sp>
+        <p:nvSpPr>
+          <p:cNvPr id="3" name="内容占位符 2"/>
+          <p:cNvSpPr>
+            <a:spLocks noGrp="1"/>
+          </p:cNvSpPr>
+          <p:nvPr>
+            <p:ph idx="1"/>
+          </p:nvPr>
+        </p:nvSpPr>
+        <p:spPr>
+          <a:xfrm>
+            <a:off x="838200" y="1825624"/>
+            <a:ext cx="10515600" cy="4807187"/>
+          </a:xfrm>
+        </p:spPr>
+        <p:txBody>
+          <a:bodyPr/>
+          <a:lstStyle/>
+          <a:p>
+            <a:r>
+              <a:rPr lang="zh-CN" altLang="en-US" smtClean="0"/>
+              <a:t>无法实现点击后实时更新当前网页的源码，不能重新获取一次，否则源码就会丢失</a:t>
+            </a:r>
+            <a:endParaRPr lang="zh-CN" altLang="en-US"/>
+          </a:p>
+        </p:txBody>
+      </p:sp>
+    </p:spTree>
+    <p:extLst>
+      <p:ext uri="{BB962C8B-B14F-4D97-AF65-F5344CB8AC3E}">
+        <p14:creationId xmlns:p14="http://schemas.microsoft.com/office/powerpoint/2010/main" val="3774816017"/>
+      </p:ext>
+    </p:extLst>
+  </p:cSld>
+  <p:clrMapOvr>
+    <a:masterClrMapping/>
+  </p:clrMapOvr>
 </p:sld>
 </file>
 

</xml_diff>